<commit_message>
Ajout de Daikon.pdf et du ppt modifié
</commit_message>
<xml_diff>
--- a/System Modeling Analysis/The Daikon system for dynamic detection of likely.pptx
+++ b/System Modeling Analysis/The Daikon system for dynamic detection of likely.pptx
@@ -7,6 +7,9 @@
   <p:notesMasterIdLst>
     <p:notesMasterId r:id="rId19"/>
   </p:notesMasterIdLst>
+  <p:handoutMasterIdLst>
+    <p:handoutMasterId r:id="rId20"/>
+  </p:handoutMasterIdLst>
   <p:sldIdLst>
     <p:sldId id="256" r:id="rId2"/>
     <p:sldId id="257" r:id="rId3"/>
@@ -27,7 +30,7 @@
     <p:sldId id="272" r:id="rId18"/>
   </p:sldIdLst>
   <p:sldSz cx="9144000" cy="6858000" type="screen4x3"/>
-  <p:notesSz cx="6858000" cy="9144000"/>
+  <p:notesSz cx="7099300" cy="10234613"/>
   <p:defaultTextStyle>
     <a:defPPr>
       <a:defRPr lang="fr-FR"/>
@@ -5601,6 +5604,168 @@
 </dgm:styleDef>
 </file>
 
+<file path=ppt/handoutMasters/handoutMaster1.xml><?xml version="1.0" encoding="utf-8"?>
+<p:handoutMaster xmlns:a="http://schemas.openxmlformats.org/drawingml/2006/main" xmlns:r="http://schemas.openxmlformats.org/officeDocument/2006/relationships" xmlns:p="http://schemas.openxmlformats.org/presentationml/2006/main">
+  <p:cSld>
+    <p:bg>
+      <p:bgRef idx="1001">
+        <a:schemeClr val="bg1"/>
+      </p:bgRef>
+    </p:bg>
+    <p:spTree>
+      <p:nvGrpSpPr>
+        <p:cNvPr id="1" name=""/>
+        <p:cNvGrpSpPr/>
+        <p:nvPr/>
+      </p:nvGrpSpPr>
+      <p:grpSpPr>
+        <a:xfrm>
+          <a:off x="0" y="0"/>
+          <a:ext cx="0" cy="0"/>
+          <a:chOff x="0" y="0"/>
+          <a:chExt cx="0" cy="0"/>
+        </a:xfrm>
+      </p:grpSpPr>
+      <p:sp>
+        <p:nvSpPr>
+          <p:cNvPr id="2" name="Espace réservé de l'en-tête 1"/>
+          <p:cNvSpPr>
+            <a:spLocks noGrp="1"/>
+          </p:cNvSpPr>
+          <p:nvPr>
+            <p:ph type="hdr" sz="quarter"/>
+          </p:nvPr>
+        </p:nvSpPr>
+        <p:spPr>
+          <a:xfrm>
+            <a:off x="0" y="0"/>
+            <a:ext cx="3076363" cy="511731"/>
+          </a:xfrm>
+          <a:prstGeom prst="rect">
+            <a:avLst/>
+          </a:prstGeom>
+        </p:spPr>
+        <p:txBody>
+          <a:bodyPr vert="horz" lIns="99048" tIns="49524" rIns="99048" bIns="49524" rtlCol="0"/>
+          <a:lstStyle>
+            <a:lvl1pPr algn="l">
+              <a:defRPr sz="1300"/>
+            </a:lvl1pPr>
+          </a:lstStyle>
+          <a:p>
+            <a:endParaRPr lang="en-US"/>
+          </a:p>
+        </p:txBody>
+      </p:sp>
+      <p:sp>
+        <p:nvSpPr>
+          <p:cNvPr id="3" name="Espace réservé de la date 2"/>
+          <p:cNvSpPr>
+            <a:spLocks noGrp="1"/>
+          </p:cNvSpPr>
+          <p:nvPr>
+            <p:ph type="dt" sz="quarter" idx="1"/>
+          </p:nvPr>
+        </p:nvSpPr>
+        <p:spPr>
+          <a:xfrm>
+            <a:off x="4021294" y="0"/>
+            <a:ext cx="3076363" cy="511731"/>
+          </a:xfrm>
+          <a:prstGeom prst="rect">
+            <a:avLst/>
+          </a:prstGeom>
+        </p:spPr>
+        <p:txBody>
+          <a:bodyPr vert="horz" lIns="99048" tIns="49524" rIns="99048" bIns="49524" rtlCol="0"/>
+          <a:lstStyle>
+            <a:lvl1pPr algn="r">
+              <a:defRPr sz="1300"/>
+            </a:lvl1pPr>
+          </a:lstStyle>
+          <a:p>
+            <a:fld id="{6B539980-6D61-4AC8-9CEE-1F3B7DC75A3C}" type="datetimeFigureOut">
+              <a:rPr lang="fr-FR" smtClean="0"/>
+              <a:pPr/>
+              <a:t>09/12/2008</a:t>
+            </a:fld>
+            <a:endParaRPr lang="en-US"/>
+          </a:p>
+        </p:txBody>
+      </p:sp>
+      <p:sp>
+        <p:nvSpPr>
+          <p:cNvPr id="4" name="Espace réservé du pied de page 3"/>
+          <p:cNvSpPr>
+            <a:spLocks noGrp="1"/>
+          </p:cNvSpPr>
+          <p:nvPr>
+            <p:ph type="ftr" sz="quarter" idx="2"/>
+          </p:nvPr>
+        </p:nvSpPr>
+        <p:spPr>
+          <a:xfrm>
+            <a:off x="0" y="9721106"/>
+            <a:ext cx="3076363" cy="511731"/>
+          </a:xfrm>
+          <a:prstGeom prst="rect">
+            <a:avLst/>
+          </a:prstGeom>
+        </p:spPr>
+        <p:txBody>
+          <a:bodyPr vert="horz" lIns="99048" tIns="49524" rIns="99048" bIns="49524" rtlCol="0" anchor="b"/>
+          <a:lstStyle>
+            <a:lvl1pPr algn="l">
+              <a:defRPr sz="1300"/>
+            </a:lvl1pPr>
+          </a:lstStyle>
+          <a:p>
+            <a:endParaRPr lang="en-US"/>
+          </a:p>
+        </p:txBody>
+      </p:sp>
+      <p:sp>
+        <p:nvSpPr>
+          <p:cNvPr id="5" name="Espace réservé du numéro de diapositive 4"/>
+          <p:cNvSpPr>
+            <a:spLocks noGrp="1"/>
+          </p:cNvSpPr>
+          <p:nvPr>
+            <p:ph type="sldNum" sz="quarter" idx="3"/>
+          </p:nvPr>
+        </p:nvSpPr>
+        <p:spPr>
+          <a:xfrm>
+            <a:off x="4021294" y="9721106"/>
+            <a:ext cx="3076363" cy="511731"/>
+          </a:xfrm>
+          <a:prstGeom prst="rect">
+            <a:avLst/>
+          </a:prstGeom>
+        </p:spPr>
+        <p:txBody>
+          <a:bodyPr vert="horz" lIns="99048" tIns="49524" rIns="99048" bIns="49524" rtlCol="0" anchor="b"/>
+          <a:lstStyle>
+            <a:lvl1pPr algn="r">
+              <a:defRPr sz="1300"/>
+            </a:lvl1pPr>
+          </a:lstStyle>
+          <a:p>
+            <a:fld id="{9A372061-CD0F-4809-9839-3D46158A9550}" type="slidenum">
+              <a:rPr lang="en-US" smtClean="0"/>
+              <a:pPr/>
+              <a:t>‹N°›</a:t>
+            </a:fld>
+            <a:endParaRPr lang="en-US"/>
+          </a:p>
+        </p:txBody>
+      </p:sp>
+    </p:spTree>
+  </p:cSld>
+  <p:clrMap bg1="lt1" tx1="dk1" bg2="lt2" tx2="dk2" accent1="accent1" accent2="accent2" accent3="accent3" accent4="accent4" accent5="accent5" accent6="accent6" hlink="hlink" folHlink="folHlink"/>
+</p:handoutMaster>
+</file>
+
 <file path=ppt/notesMasters/notesMaster1.xml><?xml version="1.0" encoding="utf-8"?>
 <p:notesMaster xmlns:a="http://schemas.openxmlformats.org/drawingml/2006/main" xmlns:r="http://schemas.openxmlformats.org/officeDocument/2006/relationships" xmlns:p="http://schemas.openxmlformats.org/presentationml/2006/main">
   <p:cSld>
@@ -5636,17 +5801,17 @@
         <p:spPr>
           <a:xfrm>
             <a:off x="0" y="0"/>
-            <a:ext cx="2971800" cy="457200"/>
+            <a:ext cx="3076363" cy="511731"/>
           </a:xfrm>
           <a:prstGeom prst="rect">
             <a:avLst/>
           </a:prstGeom>
         </p:spPr>
         <p:txBody>
-          <a:bodyPr vert="horz" lIns="91440" tIns="45720" rIns="91440" bIns="45720" rtlCol="0"/>
+          <a:bodyPr vert="horz" lIns="99048" tIns="49524" rIns="99048" bIns="49524" rtlCol="0"/>
           <a:lstStyle>
             <a:lvl1pPr algn="l">
-              <a:defRPr sz="1200"/>
+              <a:defRPr sz="1300"/>
             </a:lvl1pPr>
           </a:lstStyle>
           <a:p>
@@ -5666,25 +5831,25 @@
         </p:nvSpPr>
         <p:spPr>
           <a:xfrm>
-            <a:off x="3884613" y="0"/>
-            <a:ext cx="2971800" cy="457200"/>
+            <a:off x="4021294" y="0"/>
+            <a:ext cx="3076363" cy="511731"/>
           </a:xfrm>
           <a:prstGeom prst="rect">
             <a:avLst/>
           </a:prstGeom>
         </p:spPr>
         <p:txBody>
-          <a:bodyPr vert="horz" lIns="91440" tIns="45720" rIns="91440" bIns="45720" rtlCol="0"/>
+          <a:bodyPr vert="horz" lIns="99048" tIns="49524" rIns="99048" bIns="49524" rtlCol="0"/>
           <a:lstStyle>
             <a:lvl1pPr algn="r">
-              <a:defRPr sz="1200"/>
+              <a:defRPr sz="1300"/>
             </a:lvl1pPr>
           </a:lstStyle>
           <a:p>
             <a:fld id="{BEBD9265-33B0-461A-8B44-633B639819A3}" type="datetimeFigureOut">
               <a:rPr lang="fr-FR" smtClean="0"/>
               <a:pPr/>
-              <a:t>02/12/2008</a:t>
+              <a:t>09/12/2008</a:t>
             </a:fld>
             <a:endParaRPr lang="en-US"/>
           </a:p>
@@ -5702,8 +5867,8 @@
         </p:nvSpPr>
         <p:spPr>
           <a:xfrm>
-            <a:off x="1143000" y="685800"/>
-            <a:ext cx="4572000" cy="3429000"/>
+            <a:off x="992188" y="768350"/>
+            <a:ext cx="5114925" cy="3836988"/>
           </a:xfrm>
           <a:prstGeom prst="rect">
             <a:avLst/>
@@ -5716,7 +5881,7 @@
           </a:ln>
         </p:spPr>
         <p:txBody>
-          <a:bodyPr vert="horz" lIns="91440" tIns="45720" rIns="91440" bIns="45720" rtlCol="0" anchor="ctr"/>
+          <a:bodyPr vert="horz" lIns="99048" tIns="49524" rIns="99048" bIns="49524" rtlCol="0" anchor="ctr"/>
           <a:lstStyle/>
           <a:p>
             <a:endParaRPr lang="en-US"/>
@@ -5735,15 +5900,15 @@
         </p:nvSpPr>
         <p:spPr>
           <a:xfrm>
-            <a:off x="685800" y="4343400"/>
-            <a:ext cx="5486400" cy="4114800"/>
+            <a:off x="709930" y="4861441"/>
+            <a:ext cx="5679440" cy="4605576"/>
           </a:xfrm>
           <a:prstGeom prst="rect">
             <a:avLst/>
           </a:prstGeom>
         </p:spPr>
         <p:txBody>
-          <a:bodyPr vert="horz" lIns="91440" tIns="45720" rIns="91440" bIns="45720" rtlCol="0">
+          <a:bodyPr vert="horz" lIns="99048" tIns="49524" rIns="99048" bIns="49524" rtlCol="0">
             <a:normAutofit/>
           </a:bodyPr>
           <a:lstStyle/>
@@ -5797,18 +5962,18 @@
         </p:nvSpPr>
         <p:spPr>
           <a:xfrm>
-            <a:off x="0" y="8685213"/>
-            <a:ext cx="2971800" cy="457200"/>
+            <a:off x="0" y="9721106"/>
+            <a:ext cx="3076363" cy="511731"/>
           </a:xfrm>
           <a:prstGeom prst="rect">
             <a:avLst/>
           </a:prstGeom>
         </p:spPr>
         <p:txBody>
-          <a:bodyPr vert="horz" lIns="91440" tIns="45720" rIns="91440" bIns="45720" rtlCol="0" anchor="b"/>
+          <a:bodyPr vert="horz" lIns="99048" tIns="49524" rIns="99048" bIns="49524" rtlCol="0" anchor="b"/>
           <a:lstStyle>
             <a:lvl1pPr algn="l">
-              <a:defRPr sz="1200"/>
+              <a:defRPr sz="1300"/>
             </a:lvl1pPr>
           </a:lstStyle>
           <a:p>
@@ -5828,18 +5993,18 @@
         </p:nvSpPr>
         <p:spPr>
           <a:xfrm>
-            <a:off x="3884613" y="8685213"/>
-            <a:ext cx="2971800" cy="457200"/>
+            <a:off x="4021294" y="9721106"/>
+            <a:ext cx="3076363" cy="511731"/>
           </a:xfrm>
           <a:prstGeom prst="rect">
             <a:avLst/>
           </a:prstGeom>
         </p:spPr>
         <p:txBody>
-          <a:bodyPr vert="horz" lIns="91440" tIns="45720" rIns="91440" bIns="45720" rtlCol="0" anchor="b"/>
+          <a:bodyPr vert="horz" lIns="99048" tIns="49524" rIns="99048" bIns="49524" rtlCol="0" anchor="b"/>
           <a:lstStyle>
             <a:lvl1pPr algn="r">
-              <a:defRPr sz="1200"/>
+              <a:defRPr sz="1300"/>
             </a:lvl1pPr>
           </a:lstStyle>
           <a:p>
@@ -6778,10 +6943,9 @@
           <a:bodyPr/>
           <a:lstStyle/>
           <a:p>
-            <a:fld id="{3CE4FD73-4151-4C02-83E7-55DB63AF7CA9}" type="datetimeFigureOut">
+            <a:fld id="{71FB1F55-9824-4855-A9D9-BA3F49F6ED95}" type="datetime1">
               <a:rPr lang="fr-FR" smtClean="0"/>
-              <a:pPr/>
-              <a:t>02/12/2008</a:t>
+              <a:t>09/12/2008</a:t>
             </a:fld>
             <a:endParaRPr lang="fr-FR"/>
           </a:p>
@@ -6963,10 +7127,9 @@
           <a:bodyPr/>
           <a:lstStyle/>
           <a:p>
-            <a:fld id="{3CE4FD73-4151-4C02-83E7-55DB63AF7CA9}" type="datetimeFigureOut">
+            <a:fld id="{052EA8E6-D3BC-4BE4-8125-EC6A94DB6E8B}" type="datetime1">
               <a:rPr lang="fr-FR" smtClean="0"/>
-              <a:pPr/>
-              <a:t>02/12/2008</a:t>
+              <a:t>09/12/2008</a:t>
             </a:fld>
             <a:endParaRPr lang="fr-FR"/>
           </a:p>
@@ -7140,10 +7303,9 @@
           <a:bodyPr/>
           <a:lstStyle/>
           <a:p>
-            <a:fld id="{3CE4FD73-4151-4C02-83E7-55DB63AF7CA9}" type="datetimeFigureOut">
+            <a:fld id="{A452F6C9-4920-4CEF-8217-FB305B1EE053}" type="datetime1">
               <a:rPr lang="fr-FR" smtClean="0"/>
-              <a:pPr/>
-              <a:t>02/12/2008</a:t>
+              <a:t>09/12/2008</a:t>
             </a:fld>
             <a:endParaRPr lang="fr-FR"/>
           </a:p>
@@ -7307,10 +7469,9 @@
           <a:bodyPr/>
           <a:lstStyle/>
           <a:p>
-            <a:fld id="{3CE4FD73-4151-4C02-83E7-55DB63AF7CA9}" type="datetimeFigureOut">
+            <a:fld id="{167FC9FE-5CC0-47DC-B9AD-6B17EEB98F16}" type="datetime1">
               <a:rPr lang="fr-FR" smtClean="0"/>
-              <a:pPr/>
-              <a:t>02/12/2008</a:t>
+              <a:t>09/12/2008</a:t>
             </a:fld>
             <a:endParaRPr lang="fr-FR"/>
           </a:p>
@@ -7530,10 +7691,9 @@
           <a:bodyPr/>
           <a:lstStyle/>
           <a:p>
-            <a:fld id="{3CE4FD73-4151-4C02-83E7-55DB63AF7CA9}" type="datetimeFigureOut">
+            <a:fld id="{024D9CC8-CF12-4D48-AEF5-0C10B385D673}" type="datetime1">
               <a:rPr lang="fr-FR" smtClean="0"/>
-              <a:pPr/>
-              <a:t>02/12/2008</a:t>
+              <a:t>09/12/2008</a:t>
             </a:fld>
             <a:endParaRPr lang="fr-FR"/>
           </a:p>
@@ -7791,10 +7951,9 @@
           <a:bodyPr/>
           <a:lstStyle/>
           <a:p>
-            <a:fld id="{3CE4FD73-4151-4C02-83E7-55DB63AF7CA9}" type="datetimeFigureOut">
+            <a:fld id="{4FB74AA3-DE1A-473C-8DEA-1E20F5CDB07F}" type="datetime1">
               <a:rPr lang="fr-FR" smtClean="0"/>
-              <a:pPr/>
-              <a:t>02/12/2008</a:t>
+              <a:t>09/12/2008</a:t>
             </a:fld>
             <a:endParaRPr lang="fr-FR"/>
           </a:p>
@@ -8197,10 +8356,9 @@
           <a:bodyPr rtlCol="0"/>
           <a:lstStyle/>
           <a:p>
-            <a:fld id="{3CE4FD73-4151-4C02-83E7-55DB63AF7CA9}" type="datetimeFigureOut">
+            <a:fld id="{CD97C427-00EC-43EB-8B17-E101C7A192E1}" type="datetime1">
               <a:rPr lang="fr-FR" smtClean="0"/>
-              <a:pPr/>
-              <a:t>02/12/2008</a:t>
+              <a:t>09/12/2008</a:t>
             </a:fld>
             <a:endParaRPr lang="fr-FR"/>
           </a:p>
@@ -8330,10 +8488,9 @@
           <a:bodyPr/>
           <a:lstStyle/>
           <a:p>
-            <a:fld id="{3CE4FD73-4151-4C02-83E7-55DB63AF7CA9}" type="datetimeFigureOut">
+            <a:fld id="{45674B27-E054-4D0E-9CAC-A3E52E413879}" type="datetime1">
               <a:rPr lang="fr-FR" smtClean="0"/>
-              <a:pPr/>
-              <a:t>02/12/2008</a:t>
+              <a:t>09/12/2008</a:t>
             </a:fld>
             <a:endParaRPr lang="fr-FR"/>
           </a:p>
@@ -8432,10 +8589,9 @@
           <a:bodyPr/>
           <a:lstStyle/>
           <a:p>
-            <a:fld id="{3CE4FD73-4151-4C02-83E7-55DB63AF7CA9}" type="datetimeFigureOut">
+            <a:fld id="{689E99D1-CAAB-45FA-A3E7-3859E7F54617}" type="datetime1">
               <a:rPr lang="fr-FR" smtClean="0"/>
-              <a:pPr/>
-              <a:t>02/12/2008</a:t>
+              <a:t>09/12/2008</a:t>
             </a:fld>
             <a:endParaRPr lang="fr-FR"/>
           </a:p>
@@ -8679,10 +8835,9 @@
           <a:bodyPr/>
           <a:lstStyle/>
           <a:p>
-            <a:fld id="{3CE4FD73-4151-4C02-83E7-55DB63AF7CA9}" type="datetimeFigureOut">
+            <a:fld id="{6F25B21B-743A-4F52-822E-D42D78E24686}" type="datetime1">
               <a:rPr lang="fr-FR" smtClean="0"/>
-              <a:pPr/>
-              <a:t>02/12/2008</a:t>
+              <a:t>09/12/2008</a:t>
             </a:fld>
             <a:endParaRPr lang="fr-FR"/>
           </a:p>
@@ -8925,10 +9080,9 @@
           <a:bodyPr/>
           <a:lstStyle/>
           <a:p>
-            <a:fld id="{3CE4FD73-4151-4C02-83E7-55DB63AF7CA9}" type="datetimeFigureOut">
+            <a:fld id="{920ED0CA-1729-4B8B-83FF-6099079F3EBF}" type="datetime1">
               <a:rPr lang="fr-FR" smtClean="0"/>
-              <a:pPr/>
-              <a:t>02/12/2008</a:t>
+              <a:t>09/12/2008</a:t>
             </a:fld>
             <a:endParaRPr lang="fr-FR"/>
           </a:p>
@@ -9751,10 +9905,9 @@
             </a:lvl1pPr>
           </a:lstStyle>
           <a:p>
-            <a:fld id="{3CE4FD73-4151-4C02-83E7-55DB63AF7CA9}" type="datetimeFigureOut">
+            <a:fld id="{2614A940-62D8-4F21-9998-BD93572473CD}" type="datetime1">
               <a:rPr lang="fr-FR" smtClean="0"/>
-              <a:pPr/>
-              <a:t>02/12/2008</a:t>
+              <a:t>09/12/2008</a:t>
             </a:fld>
             <a:endParaRPr lang="fr-FR"/>
           </a:p>
@@ -9851,6 +10004,7 @@
     <p:sldLayoutId id="2147483790" r:id="rId10"/>
     <p:sldLayoutId id="2147483791" r:id="rId11"/>
   </p:sldLayoutIdLst>
+  <p:hf hdr="0" ftr="0" dt="0"/>
   <p:txStyles>
     <p:titleStyle>
       <a:lvl1pPr algn="l" rtl="0" eaLnBrk="1" latinLnBrk="0" hangingPunct="1">
@@ -10301,6 +10455,30 @@
           </a:p>
         </p:txBody>
       </p:sp>
+      <p:sp>
+        <p:nvSpPr>
+          <p:cNvPr id="5" name="Espace réservé du numéro de diapositive 4"/>
+          <p:cNvSpPr>
+            <a:spLocks noGrp="1"/>
+          </p:cNvSpPr>
+          <p:nvPr>
+            <p:ph type="sldNum" sz="quarter" idx="12"/>
+          </p:nvPr>
+        </p:nvSpPr>
+        <p:spPr/>
+        <p:txBody>
+          <a:bodyPr/>
+          <a:lstStyle/>
+          <a:p>
+            <a:fld id="{C59E0035-AE90-440C-AA1E-C825D223288E}" type="slidenum">
+              <a:rPr lang="fr-FR" smtClean="0"/>
+              <a:pPr/>
+              <a:t>1</a:t>
+            </a:fld>
+            <a:endParaRPr lang="fr-FR"/>
+          </a:p>
+        </p:txBody>
+      </p:sp>
     </p:spTree>
   </p:cSld>
   <p:clrMapOvr>
@@ -10520,6 +10698,30 @@
           </a:p>
         </p:txBody>
       </p:sp>
+      <p:sp>
+        <p:nvSpPr>
+          <p:cNvPr id="6" name="Espace réservé du numéro de diapositive 5"/>
+          <p:cNvSpPr>
+            <a:spLocks noGrp="1"/>
+          </p:cNvSpPr>
+          <p:nvPr>
+            <p:ph type="sldNum" sz="quarter" idx="12"/>
+          </p:nvPr>
+        </p:nvSpPr>
+        <p:spPr/>
+        <p:txBody>
+          <a:bodyPr/>
+          <a:lstStyle/>
+          <a:p>
+            <a:fld id="{C59E0035-AE90-440C-AA1E-C825D223288E}" type="slidenum">
+              <a:rPr lang="fr-FR" smtClean="0"/>
+              <a:pPr/>
+              <a:t>10</a:t>
+            </a:fld>
+            <a:endParaRPr lang="fr-FR"/>
+          </a:p>
+        </p:txBody>
+      </p:sp>
     </p:spTree>
   </p:cSld>
   <p:clrMapOvr>
@@ -10730,6 +10932,30 @@
               </a:solidFill>
               <a:latin typeface="+mj-lt"/>
             </a:endParaRPr>
+          </a:p>
+        </p:txBody>
+      </p:sp>
+      <p:sp>
+        <p:nvSpPr>
+          <p:cNvPr id="5" name="Espace réservé du numéro de diapositive 4"/>
+          <p:cNvSpPr>
+            <a:spLocks noGrp="1"/>
+          </p:cNvSpPr>
+          <p:nvPr>
+            <p:ph type="sldNum" sz="quarter" idx="12"/>
+          </p:nvPr>
+        </p:nvSpPr>
+        <p:spPr/>
+        <p:txBody>
+          <a:bodyPr/>
+          <a:lstStyle/>
+          <a:p>
+            <a:fld id="{C59E0035-AE90-440C-AA1E-C825D223288E}" type="slidenum">
+              <a:rPr lang="fr-FR" smtClean="0"/>
+              <a:pPr/>
+              <a:t>11</a:t>
+            </a:fld>
+            <a:endParaRPr lang="fr-FR"/>
           </a:p>
         </p:txBody>
       </p:sp>
@@ -11879,6 +12105,30 @@
           </a:p>
         </p:txBody>
       </p:sp>
+      <p:sp>
+        <p:nvSpPr>
+          <p:cNvPr id="28" name="Espace réservé du numéro de diapositive 27"/>
+          <p:cNvSpPr>
+            <a:spLocks noGrp="1"/>
+          </p:cNvSpPr>
+          <p:nvPr>
+            <p:ph type="sldNum" sz="quarter" idx="12"/>
+          </p:nvPr>
+        </p:nvSpPr>
+        <p:spPr/>
+        <p:txBody>
+          <a:bodyPr/>
+          <a:lstStyle/>
+          <a:p>
+            <a:fld id="{C59E0035-AE90-440C-AA1E-C825D223288E}" type="slidenum">
+              <a:rPr lang="fr-FR" smtClean="0"/>
+              <a:pPr/>
+              <a:t>12</a:t>
+            </a:fld>
+            <a:endParaRPr lang="fr-FR"/>
+          </a:p>
+        </p:txBody>
+      </p:sp>
     </p:spTree>
   </p:cSld>
   <p:clrMapOvr>
@@ -12108,6 +12358,30 @@
           </a:p>
         </p:txBody>
       </p:sp>
+      <p:sp>
+        <p:nvSpPr>
+          <p:cNvPr id="5" name="Espace réservé du numéro de diapositive 4"/>
+          <p:cNvSpPr>
+            <a:spLocks noGrp="1"/>
+          </p:cNvSpPr>
+          <p:nvPr>
+            <p:ph type="sldNum" sz="quarter" idx="12"/>
+          </p:nvPr>
+        </p:nvSpPr>
+        <p:spPr/>
+        <p:txBody>
+          <a:bodyPr/>
+          <a:lstStyle/>
+          <a:p>
+            <a:fld id="{C59E0035-AE90-440C-AA1E-C825D223288E}" type="slidenum">
+              <a:rPr lang="fr-FR" smtClean="0"/>
+              <a:pPr/>
+              <a:t>13</a:t>
+            </a:fld>
+            <a:endParaRPr lang="fr-FR"/>
+          </a:p>
+        </p:txBody>
+      </p:sp>
     </p:spTree>
   </p:cSld>
   <p:clrMapOvr>
@@ -12387,6 +12661,30 @@
           </a:p>
         </p:txBody>
       </p:sp>
+      <p:sp>
+        <p:nvSpPr>
+          <p:cNvPr id="7" name="Espace réservé du numéro de diapositive 6"/>
+          <p:cNvSpPr>
+            <a:spLocks noGrp="1"/>
+          </p:cNvSpPr>
+          <p:nvPr>
+            <p:ph type="sldNum" sz="quarter" idx="12"/>
+          </p:nvPr>
+        </p:nvSpPr>
+        <p:spPr/>
+        <p:txBody>
+          <a:bodyPr/>
+          <a:lstStyle/>
+          <a:p>
+            <a:fld id="{C59E0035-AE90-440C-AA1E-C825D223288E}" type="slidenum">
+              <a:rPr lang="fr-FR" smtClean="0"/>
+              <a:pPr/>
+              <a:t>14</a:t>
+            </a:fld>
+            <a:endParaRPr lang="fr-FR"/>
+          </a:p>
+        </p:txBody>
+      </p:sp>
     </p:spTree>
   </p:cSld>
   <p:clrMapOvr>
@@ -12712,6 +13010,30 @@
               <a:latin typeface="Courier New" pitchFamily="49" charset="0"/>
               <a:cs typeface="Courier New" pitchFamily="49" charset="0"/>
             </a:endParaRPr>
+          </a:p>
+        </p:txBody>
+      </p:sp>
+      <p:sp>
+        <p:nvSpPr>
+          <p:cNvPr id="6" name="Espace réservé du numéro de diapositive 5"/>
+          <p:cNvSpPr>
+            <a:spLocks noGrp="1"/>
+          </p:cNvSpPr>
+          <p:nvPr>
+            <p:ph type="sldNum" sz="quarter" idx="12"/>
+          </p:nvPr>
+        </p:nvSpPr>
+        <p:spPr/>
+        <p:txBody>
+          <a:bodyPr/>
+          <a:lstStyle/>
+          <a:p>
+            <a:fld id="{C59E0035-AE90-440C-AA1E-C825D223288E}" type="slidenum">
+              <a:rPr lang="fr-FR" smtClean="0"/>
+              <a:pPr/>
+              <a:t>15</a:t>
+            </a:fld>
+            <a:endParaRPr lang="fr-FR"/>
           </a:p>
         </p:txBody>
       </p:sp>
@@ -13331,6 +13653,30 @@
           </a:fontRef>
         </p:style>
       </p:cxnSp>
+      <p:sp>
+        <p:nvSpPr>
+          <p:cNvPr id="18" name="Espace réservé du numéro de diapositive 17"/>
+          <p:cNvSpPr>
+            <a:spLocks noGrp="1"/>
+          </p:cNvSpPr>
+          <p:nvPr>
+            <p:ph type="sldNum" sz="quarter" idx="12"/>
+          </p:nvPr>
+        </p:nvSpPr>
+        <p:spPr/>
+        <p:txBody>
+          <a:bodyPr/>
+          <a:lstStyle/>
+          <a:p>
+            <a:fld id="{C59E0035-AE90-440C-AA1E-C825D223288E}" type="slidenum">
+              <a:rPr lang="fr-FR" smtClean="0"/>
+              <a:pPr/>
+              <a:t>16</a:t>
+            </a:fld>
+            <a:endParaRPr lang="fr-FR"/>
+          </a:p>
+        </p:txBody>
+      </p:sp>
     </p:spTree>
   </p:cSld>
   <p:clrMapOvr>
@@ -13472,6 +13818,30 @@
           </a:p>
         </p:txBody>
       </p:sp>
+      <p:sp>
+        <p:nvSpPr>
+          <p:cNvPr id="4" name="Espace réservé du numéro de diapositive 3"/>
+          <p:cNvSpPr>
+            <a:spLocks noGrp="1"/>
+          </p:cNvSpPr>
+          <p:nvPr>
+            <p:ph type="sldNum" sz="quarter" idx="12"/>
+          </p:nvPr>
+        </p:nvSpPr>
+        <p:spPr/>
+        <p:txBody>
+          <a:bodyPr/>
+          <a:lstStyle/>
+          <a:p>
+            <a:fld id="{C59E0035-AE90-440C-AA1E-C825D223288E}" type="slidenum">
+              <a:rPr lang="fr-FR" smtClean="0"/>
+              <a:pPr/>
+              <a:t>17</a:t>
+            </a:fld>
+            <a:endParaRPr lang="fr-FR"/>
+          </a:p>
+        </p:txBody>
+      </p:sp>
     </p:spTree>
   </p:cSld>
   <p:clrMapOvr>
@@ -13545,6 +13915,30 @@
           </a:graphicData>
         </a:graphic>
       </p:graphicFrame>
+      <p:sp>
+        <p:nvSpPr>
+          <p:cNvPr id="6" name="Espace réservé du numéro de diapositive 5"/>
+          <p:cNvSpPr>
+            <a:spLocks noGrp="1"/>
+          </p:cNvSpPr>
+          <p:nvPr>
+            <p:ph type="sldNum" sz="quarter" idx="12"/>
+          </p:nvPr>
+        </p:nvSpPr>
+        <p:spPr/>
+        <p:txBody>
+          <a:bodyPr/>
+          <a:lstStyle/>
+          <a:p>
+            <a:fld id="{C59E0035-AE90-440C-AA1E-C825D223288E}" type="slidenum">
+              <a:rPr lang="fr-FR" smtClean="0"/>
+              <a:pPr/>
+              <a:t>2</a:t>
+            </a:fld>
+            <a:endParaRPr lang="fr-FR"/>
+          </a:p>
+        </p:txBody>
+      </p:sp>
     </p:spTree>
   </p:cSld>
   <p:clrMapOvr>
@@ -13954,6 +14348,30 @@
           </a:p>
         </p:txBody>
       </p:sp>
+      <p:sp>
+        <p:nvSpPr>
+          <p:cNvPr id="9" name="Espace réservé du numéro de diapositive 8"/>
+          <p:cNvSpPr>
+            <a:spLocks noGrp="1"/>
+          </p:cNvSpPr>
+          <p:nvPr>
+            <p:ph type="sldNum" sz="quarter" idx="12"/>
+          </p:nvPr>
+        </p:nvSpPr>
+        <p:spPr/>
+        <p:txBody>
+          <a:bodyPr/>
+          <a:lstStyle/>
+          <a:p>
+            <a:fld id="{C59E0035-AE90-440C-AA1E-C825D223288E}" type="slidenum">
+              <a:rPr lang="fr-FR" smtClean="0"/>
+              <a:pPr/>
+              <a:t>3</a:t>
+            </a:fld>
+            <a:endParaRPr lang="fr-FR"/>
+          </a:p>
+        </p:txBody>
+      </p:sp>
     </p:spTree>
   </p:cSld>
   <p:clrMapOvr>
@@ -14077,6 +14495,30 @@
           </a:p>
         </p:txBody>
       </p:sp>
+      <p:sp>
+        <p:nvSpPr>
+          <p:cNvPr id="7" name="Espace réservé du numéro de diapositive 6"/>
+          <p:cNvSpPr>
+            <a:spLocks noGrp="1"/>
+          </p:cNvSpPr>
+          <p:nvPr>
+            <p:ph type="sldNum" sz="quarter" idx="12"/>
+          </p:nvPr>
+        </p:nvSpPr>
+        <p:spPr/>
+        <p:txBody>
+          <a:bodyPr/>
+          <a:lstStyle/>
+          <a:p>
+            <a:fld id="{C59E0035-AE90-440C-AA1E-C825D223288E}" type="slidenum">
+              <a:rPr lang="fr-FR" smtClean="0"/>
+              <a:pPr/>
+              <a:t>4</a:t>
+            </a:fld>
+            <a:endParaRPr lang="fr-FR"/>
+          </a:p>
+        </p:txBody>
+      </p:sp>
     </p:spTree>
   </p:cSld>
   <p:clrMapOvr>
@@ -14214,18 +14656,306 @@
         <p:spPr>
           <a:xfrm>
             <a:off x="381000" y="2000240"/>
-            <a:ext cx="4041648" cy="4594479"/>
+            <a:ext cx="3333744" cy="4594479"/>
           </a:xfrm>
         </p:spPr>
         <p:txBody>
-          <a:bodyPr/>
+          <a:bodyPr>
+            <a:normAutofit lnSpcReduction="10000"/>
+          </a:bodyPr>
           <a:lstStyle/>
           <a:p>
-            <a:r>
-              <a:rPr lang="en-US" dirty="0" smtClean="0"/>
-              <a:t>To do	</a:t>
-            </a:r>
-            <a:endParaRPr lang="en-US" dirty="0"/>
+            <a:pPr>
+              <a:buNone/>
+            </a:pPr>
+            <a:r>
+              <a:rPr lang="fr-FR" sz="1200" dirty="0" smtClean="0"/>
+              <a:t>package perso;</a:t>
+            </a:r>
+          </a:p>
+          <a:p>
+            <a:pPr>
+              <a:buNone/>
+            </a:pPr>
+            <a:r>
+              <a:rPr lang="fr-FR" sz="1200" dirty="0" smtClean="0"/>
+              <a:t>public class test2{</a:t>
+            </a:r>
+          </a:p>
+          <a:p>
+            <a:pPr>
+              <a:buNone/>
+            </a:pPr>
+            <a:r>
+              <a:rPr lang="fr-FR" sz="1200" dirty="0" smtClean="0"/>
+              <a:t>	</a:t>
+            </a:r>
+          </a:p>
+          <a:p>
+            <a:pPr>
+              <a:buNone/>
+            </a:pPr>
+            <a:r>
+              <a:rPr lang="fr-FR" sz="1200" dirty="0" smtClean="0"/>
+              <a:t>	public </a:t>
+            </a:r>
+            <a:r>
+              <a:rPr lang="fr-FR" sz="1200" dirty="0" err="1" smtClean="0"/>
+              <a:t>static</a:t>
+            </a:r>
+            <a:r>
+              <a:rPr lang="fr-FR" sz="1200" dirty="0" smtClean="0"/>
+              <a:t> </a:t>
+            </a:r>
+            <a:r>
+              <a:rPr lang="fr-FR" sz="1200" dirty="0" err="1" smtClean="0"/>
+              <a:t>int</a:t>
+            </a:r>
+            <a:r>
+              <a:rPr lang="fr-FR" sz="1200" dirty="0" smtClean="0"/>
+              <a:t> l;</a:t>
+            </a:r>
+          </a:p>
+          <a:p>
+            <a:pPr>
+              <a:buNone/>
+            </a:pPr>
+            <a:r>
+              <a:rPr lang="fr-FR" sz="1200" dirty="0" smtClean="0"/>
+              <a:t>	public </a:t>
+            </a:r>
+            <a:r>
+              <a:rPr lang="fr-FR" sz="1200" dirty="0" err="1" smtClean="0"/>
+              <a:t>static</a:t>
+            </a:r>
+            <a:r>
+              <a:rPr lang="fr-FR" sz="1200" dirty="0" smtClean="0"/>
+              <a:t> </a:t>
+            </a:r>
+            <a:r>
+              <a:rPr lang="fr-FR" sz="1200" dirty="0" err="1" smtClean="0"/>
+              <a:t>int</a:t>
+            </a:r>
+            <a:r>
+              <a:rPr lang="fr-FR" sz="1200" dirty="0" smtClean="0"/>
+              <a:t> i;</a:t>
+            </a:r>
+          </a:p>
+          <a:p>
+            <a:pPr>
+              <a:buNone/>
+            </a:pPr>
+            <a:r>
+              <a:rPr lang="fr-FR" sz="1200" dirty="0" smtClean="0"/>
+              <a:t>	public </a:t>
+            </a:r>
+            <a:r>
+              <a:rPr lang="fr-FR" sz="1200" dirty="0" err="1" smtClean="0"/>
+              <a:t>static</a:t>
+            </a:r>
+            <a:r>
+              <a:rPr lang="fr-FR" sz="1200" dirty="0" smtClean="0"/>
+              <a:t> </a:t>
+            </a:r>
+            <a:r>
+              <a:rPr lang="fr-FR" sz="1200" dirty="0" err="1" smtClean="0"/>
+              <a:t>int</a:t>
+            </a:r>
+            <a:r>
+              <a:rPr lang="fr-FR" sz="1200" dirty="0" smtClean="0"/>
+              <a:t> </a:t>
+            </a:r>
+            <a:r>
+              <a:rPr lang="fr-FR" sz="1200" dirty="0" err="1" smtClean="0"/>
+              <a:t>useless</a:t>
+            </a:r>
+            <a:r>
+              <a:rPr lang="fr-FR" sz="1200" dirty="0" smtClean="0"/>
+              <a:t>;</a:t>
+            </a:r>
+          </a:p>
+          <a:p>
+            <a:pPr>
+              <a:buNone/>
+            </a:pPr>
+            <a:endParaRPr lang="en-US" sz="1200" dirty="0" smtClean="0"/>
+          </a:p>
+          <a:p>
+            <a:pPr>
+              <a:buNone/>
+            </a:pPr>
+            <a:r>
+              <a:rPr lang="en-US" sz="1200" dirty="0" smtClean="0"/>
+              <a:t>public static void main(String </a:t>
+            </a:r>
+            <a:r>
+              <a:rPr lang="en-US" sz="1200" dirty="0" err="1" smtClean="0"/>
+              <a:t>args</a:t>
+            </a:r>
+            <a:r>
+              <a:rPr lang="en-US" sz="1200" dirty="0" smtClean="0"/>
+              <a:t>[]){</a:t>
+            </a:r>
+          </a:p>
+          <a:p>
+            <a:pPr>
+              <a:buNone/>
+            </a:pPr>
+            <a:r>
+              <a:rPr lang="fr-FR" sz="1200" dirty="0" smtClean="0"/>
+              <a:t>		test2.l=0;</a:t>
+            </a:r>
+          </a:p>
+          <a:p>
+            <a:pPr>
+              <a:buNone/>
+            </a:pPr>
+            <a:r>
+              <a:rPr lang="fr-FR" sz="1200" dirty="0" smtClean="0"/>
+              <a:t>		test2.i=0;</a:t>
+            </a:r>
+          </a:p>
+          <a:p>
+            <a:pPr>
+              <a:buNone/>
+            </a:pPr>
+            <a:r>
+              <a:rPr lang="fr-FR" sz="1200" dirty="0" smtClean="0"/>
+              <a:t>		</a:t>
+            </a:r>
+            <a:r>
+              <a:rPr lang="fr-FR" sz="1200" dirty="0" err="1" smtClean="0"/>
+              <a:t>while</a:t>
+            </a:r>
+            <a:r>
+              <a:rPr lang="fr-FR" sz="1200" dirty="0" smtClean="0"/>
+              <a:t>(10 &gt;= test2.l){</a:t>
+            </a:r>
+          </a:p>
+          <a:p>
+            <a:pPr>
+              <a:buNone/>
+            </a:pPr>
+            <a:r>
+              <a:rPr lang="fr-FR" sz="1200" dirty="0" smtClean="0"/>
+              <a:t>			test2.</a:t>
+            </a:r>
+            <a:r>
+              <a:rPr lang="fr-FR" sz="1200" dirty="0" err="1" smtClean="0"/>
+              <a:t>incr</a:t>
+            </a:r>
+            <a:r>
+              <a:rPr lang="fr-FR" sz="1200" dirty="0" smtClean="0"/>
+              <a:t>();</a:t>
+            </a:r>
+          </a:p>
+          <a:p>
+            <a:pPr>
+              <a:buNone/>
+            </a:pPr>
+            <a:endParaRPr lang="fr-FR" sz="1200" dirty="0" smtClean="0"/>
+          </a:p>
+          <a:p>
+            <a:pPr>
+              <a:buNone/>
+            </a:pPr>
+            <a:r>
+              <a:rPr lang="fr-FR" sz="1200" dirty="0" smtClean="0"/>
+              <a:t>		}</a:t>
+            </a:r>
+          </a:p>
+          <a:p>
+            <a:pPr>
+              <a:buNone/>
+            </a:pPr>
+            <a:r>
+              <a:rPr lang="fr-FR" sz="1200" dirty="0" smtClean="0"/>
+              <a:t>	}</a:t>
+            </a:r>
+          </a:p>
+          <a:p>
+            <a:pPr>
+              <a:buNone/>
+            </a:pPr>
+            <a:endParaRPr lang="fr-FR" sz="1200" dirty="0" smtClean="0"/>
+          </a:p>
+          <a:p>
+            <a:pPr>
+              <a:buNone/>
+            </a:pPr>
+            <a:r>
+              <a:rPr lang="fr-FR" sz="1200" dirty="0" smtClean="0"/>
+              <a:t>	public </a:t>
+            </a:r>
+            <a:r>
+              <a:rPr lang="fr-FR" sz="1200" dirty="0" err="1" smtClean="0"/>
+              <a:t>static</a:t>
+            </a:r>
+            <a:r>
+              <a:rPr lang="fr-FR" sz="1200" dirty="0" smtClean="0"/>
+              <a:t> </a:t>
+            </a:r>
+            <a:r>
+              <a:rPr lang="fr-FR" sz="1200" dirty="0" err="1" smtClean="0"/>
+              <a:t>void</a:t>
+            </a:r>
+            <a:r>
+              <a:rPr lang="fr-FR" sz="1200" dirty="0" smtClean="0"/>
+              <a:t> </a:t>
+            </a:r>
+            <a:r>
+              <a:rPr lang="fr-FR" sz="1200" dirty="0" err="1" smtClean="0"/>
+              <a:t>incr</a:t>
+            </a:r>
+            <a:r>
+              <a:rPr lang="fr-FR" sz="1200" dirty="0" smtClean="0"/>
+              <a:t>(){</a:t>
+            </a:r>
+          </a:p>
+          <a:p>
+            <a:pPr>
+              <a:buNone/>
+            </a:pPr>
+            <a:r>
+              <a:rPr lang="fr-FR" sz="1200" dirty="0" smtClean="0"/>
+              <a:t>		test2.l++;</a:t>
+            </a:r>
+          </a:p>
+          <a:p>
+            <a:pPr>
+              <a:buNone/>
+            </a:pPr>
+            <a:r>
+              <a:rPr lang="fr-FR" sz="1200" dirty="0" smtClean="0"/>
+              <a:t>		test2.i++;</a:t>
+            </a:r>
+          </a:p>
+          <a:p>
+            <a:pPr>
+              <a:buNone/>
+            </a:pPr>
+            <a:r>
+              <a:rPr lang="fr-FR" sz="1200" dirty="0" smtClean="0"/>
+              <a:t>	}</a:t>
+            </a:r>
+          </a:p>
+          <a:p>
+            <a:pPr>
+              <a:buNone/>
+            </a:pPr>
+            <a:r>
+              <a:rPr lang="fr-FR" sz="1200" dirty="0" smtClean="0"/>
+              <a:t>}</a:t>
+            </a:r>
+          </a:p>
+          <a:p>
+            <a:pPr>
+              <a:buNone/>
+            </a:pPr>
+            <a:endParaRPr lang="en-US" sz="1200" dirty="0">
+              <a:latin typeface="Courier New" pitchFamily="49" charset="0"/>
+              <a:cs typeface="Courier New" pitchFamily="49" charset="0"/>
+            </a:endParaRPr>
           </a:p>
         </p:txBody>
       </p:sp>
@@ -14269,18 +14999,427 @@
         </p:nvSpPr>
         <p:spPr>
           <a:xfrm>
-            <a:off x="4718304" y="2071678"/>
+            <a:off x="4857752" y="2071678"/>
             <a:ext cx="4041775" cy="4523041"/>
           </a:xfrm>
         </p:spPr>
         <p:txBody>
-          <a:bodyPr/>
+          <a:bodyPr>
+            <a:normAutofit fontScale="55000" lnSpcReduction="20000"/>
+          </a:bodyPr>
           <a:lstStyle/>
           <a:p>
-            <a:r>
-              <a:rPr lang="en-US" dirty="0" smtClean="0"/>
-              <a:t>To do</a:t>
-            </a:r>
+            <a:pPr>
+              <a:buNone/>
+            </a:pPr>
+            <a:r>
+              <a:rPr lang="fr-FR" dirty="0" err="1" smtClean="0">
+                <a:latin typeface="Courier New" pitchFamily="49" charset="0"/>
+                <a:cs typeface="Courier New" pitchFamily="49" charset="0"/>
+              </a:rPr>
+              <a:t>perso.test2</a:t>
+            </a:r>
+            <a:r>
+              <a:rPr lang="fr-FR" dirty="0" smtClean="0">
+                <a:latin typeface="Courier New" pitchFamily="49" charset="0"/>
+                <a:cs typeface="Courier New" pitchFamily="49" charset="0"/>
+              </a:rPr>
+              <a:t>.</a:t>
+            </a:r>
+            <a:r>
+              <a:rPr lang="fr-FR" dirty="0" err="1" smtClean="0">
+                <a:latin typeface="Courier New" pitchFamily="49" charset="0"/>
+                <a:cs typeface="Courier New" pitchFamily="49" charset="0"/>
+              </a:rPr>
+              <a:t>incr</a:t>
+            </a:r>
+            <a:r>
+              <a:rPr lang="fr-FR" dirty="0" smtClean="0">
+                <a:latin typeface="Courier New" pitchFamily="49" charset="0"/>
+                <a:cs typeface="Courier New" pitchFamily="49" charset="0"/>
+              </a:rPr>
+              <a:t>():::ENTER</a:t>
+            </a:r>
+          </a:p>
+          <a:p>
+            <a:pPr>
+              <a:buNone/>
+            </a:pPr>
+            <a:r>
+              <a:rPr lang="fr-FR" dirty="0" err="1" smtClean="0">
+                <a:latin typeface="Courier New" pitchFamily="49" charset="0"/>
+                <a:cs typeface="Courier New" pitchFamily="49" charset="0"/>
+              </a:rPr>
+              <a:t>this_invocation_nonce</a:t>
+            </a:r>
+            <a:endParaRPr lang="fr-FR" dirty="0" smtClean="0">
+              <a:latin typeface="Courier New" pitchFamily="49" charset="0"/>
+              <a:cs typeface="Courier New" pitchFamily="49" charset="0"/>
+            </a:endParaRPr>
+          </a:p>
+          <a:p>
+            <a:pPr>
+              <a:buNone/>
+            </a:pPr>
+            <a:r>
+              <a:rPr lang="fr-FR" dirty="0" smtClean="0">
+                <a:latin typeface="Courier New" pitchFamily="49" charset="0"/>
+                <a:cs typeface="Courier New" pitchFamily="49" charset="0"/>
+              </a:rPr>
+              <a:t>4</a:t>
+            </a:r>
+          </a:p>
+          <a:p>
+            <a:pPr>
+              <a:buNone/>
+            </a:pPr>
+            <a:r>
+              <a:rPr lang="fr-FR" dirty="0" err="1" smtClean="0">
+                <a:latin typeface="Courier New" pitchFamily="49" charset="0"/>
+                <a:cs typeface="Courier New" pitchFamily="49" charset="0"/>
+              </a:rPr>
+              <a:t>perso.test2</a:t>
+            </a:r>
+            <a:r>
+              <a:rPr lang="fr-FR" dirty="0" smtClean="0">
+                <a:latin typeface="Courier New" pitchFamily="49" charset="0"/>
+                <a:cs typeface="Courier New" pitchFamily="49" charset="0"/>
+              </a:rPr>
+              <a:t>.l</a:t>
+            </a:r>
+          </a:p>
+          <a:p>
+            <a:pPr>
+              <a:buNone/>
+            </a:pPr>
+            <a:r>
+              <a:rPr lang="fr-FR" dirty="0" smtClean="0">
+                <a:latin typeface="Courier New" pitchFamily="49" charset="0"/>
+                <a:cs typeface="Courier New" pitchFamily="49" charset="0"/>
+              </a:rPr>
+              <a:t>3</a:t>
+            </a:r>
+          </a:p>
+          <a:p>
+            <a:pPr>
+              <a:buNone/>
+            </a:pPr>
+            <a:r>
+              <a:rPr lang="fr-FR" dirty="0" smtClean="0">
+                <a:latin typeface="Courier New" pitchFamily="49" charset="0"/>
+                <a:cs typeface="Courier New" pitchFamily="49" charset="0"/>
+              </a:rPr>
+              <a:t>1</a:t>
+            </a:r>
+          </a:p>
+          <a:p>
+            <a:pPr>
+              <a:buNone/>
+            </a:pPr>
+            <a:r>
+              <a:rPr lang="fr-FR" dirty="0" err="1" smtClean="0">
+                <a:latin typeface="Courier New" pitchFamily="49" charset="0"/>
+                <a:cs typeface="Courier New" pitchFamily="49" charset="0"/>
+              </a:rPr>
+              <a:t>perso.test2</a:t>
+            </a:r>
+            <a:r>
+              <a:rPr lang="fr-FR" dirty="0" smtClean="0">
+                <a:latin typeface="Courier New" pitchFamily="49" charset="0"/>
+                <a:cs typeface="Courier New" pitchFamily="49" charset="0"/>
+              </a:rPr>
+              <a:t>.i</a:t>
+            </a:r>
+          </a:p>
+          <a:p>
+            <a:pPr>
+              <a:buNone/>
+            </a:pPr>
+            <a:r>
+              <a:rPr lang="fr-FR" dirty="0" smtClean="0">
+                <a:latin typeface="Courier New" pitchFamily="49" charset="0"/>
+                <a:cs typeface="Courier New" pitchFamily="49" charset="0"/>
+              </a:rPr>
+              <a:t>3</a:t>
+            </a:r>
+          </a:p>
+          <a:p>
+            <a:pPr>
+              <a:buNone/>
+            </a:pPr>
+            <a:r>
+              <a:rPr lang="fr-FR" dirty="0" smtClean="0">
+                <a:latin typeface="Courier New" pitchFamily="49" charset="0"/>
+                <a:cs typeface="Courier New" pitchFamily="49" charset="0"/>
+              </a:rPr>
+              <a:t>1</a:t>
+            </a:r>
+          </a:p>
+          <a:p>
+            <a:pPr>
+              <a:buNone/>
+            </a:pPr>
+            <a:r>
+              <a:rPr lang="fr-FR" dirty="0" err="1" smtClean="0">
+                <a:latin typeface="Courier New" pitchFamily="49" charset="0"/>
+                <a:cs typeface="Courier New" pitchFamily="49" charset="0"/>
+              </a:rPr>
+              <a:t>perso.test2</a:t>
+            </a:r>
+            <a:r>
+              <a:rPr lang="fr-FR" dirty="0" smtClean="0">
+                <a:latin typeface="Courier New" pitchFamily="49" charset="0"/>
+                <a:cs typeface="Courier New" pitchFamily="49" charset="0"/>
+              </a:rPr>
+              <a:t>.</a:t>
+            </a:r>
+            <a:r>
+              <a:rPr lang="fr-FR" dirty="0" err="1" smtClean="0">
+                <a:latin typeface="Courier New" pitchFamily="49" charset="0"/>
+                <a:cs typeface="Courier New" pitchFamily="49" charset="0"/>
+              </a:rPr>
+              <a:t>useless</a:t>
+            </a:r>
+            <a:endParaRPr lang="fr-FR" dirty="0" smtClean="0">
+              <a:latin typeface="Courier New" pitchFamily="49" charset="0"/>
+              <a:cs typeface="Courier New" pitchFamily="49" charset="0"/>
+            </a:endParaRPr>
+          </a:p>
+          <a:p>
+            <a:pPr>
+              <a:buNone/>
+            </a:pPr>
+            <a:r>
+              <a:rPr lang="fr-FR" dirty="0" smtClean="0">
+                <a:latin typeface="Courier New" pitchFamily="49" charset="0"/>
+                <a:cs typeface="Courier New" pitchFamily="49" charset="0"/>
+              </a:rPr>
+              <a:t>0</a:t>
+            </a:r>
+          </a:p>
+          <a:p>
+            <a:pPr>
+              <a:buNone/>
+            </a:pPr>
+            <a:r>
+              <a:rPr lang="fr-FR" dirty="0" smtClean="0">
+                <a:latin typeface="Courier New" pitchFamily="49" charset="0"/>
+                <a:cs typeface="Courier New" pitchFamily="49" charset="0"/>
+              </a:rPr>
+              <a:t>1</a:t>
+            </a:r>
+          </a:p>
+          <a:p>
+            <a:pPr>
+              <a:buNone/>
+            </a:pPr>
+            <a:endParaRPr lang="fr-FR" dirty="0" smtClean="0">
+              <a:latin typeface="Courier New" pitchFamily="49" charset="0"/>
+              <a:cs typeface="Courier New" pitchFamily="49" charset="0"/>
+            </a:endParaRPr>
+          </a:p>
+          <a:p>
+            <a:pPr>
+              <a:buNone/>
+            </a:pPr>
+            <a:r>
+              <a:rPr lang="fr-FR" dirty="0" err="1" smtClean="0">
+                <a:latin typeface="Courier New" pitchFamily="49" charset="0"/>
+                <a:cs typeface="Courier New" pitchFamily="49" charset="0"/>
+              </a:rPr>
+              <a:t>perso.test2</a:t>
+            </a:r>
+            <a:r>
+              <a:rPr lang="fr-FR" dirty="0" smtClean="0">
+                <a:latin typeface="Courier New" pitchFamily="49" charset="0"/>
+                <a:cs typeface="Courier New" pitchFamily="49" charset="0"/>
+              </a:rPr>
+              <a:t>.</a:t>
+            </a:r>
+            <a:r>
+              <a:rPr lang="fr-FR" dirty="0" err="1" smtClean="0">
+                <a:latin typeface="Courier New" pitchFamily="49" charset="0"/>
+                <a:cs typeface="Courier New" pitchFamily="49" charset="0"/>
+              </a:rPr>
+              <a:t>incr</a:t>
+            </a:r>
+            <a:r>
+              <a:rPr lang="fr-FR" dirty="0" smtClean="0">
+                <a:latin typeface="Courier New" pitchFamily="49" charset="0"/>
+                <a:cs typeface="Courier New" pitchFamily="49" charset="0"/>
+              </a:rPr>
+              <a:t>():::EXIT26</a:t>
+            </a:r>
+          </a:p>
+          <a:p>
+            <a:pPr>
+              <a:buNone/>
+            </a:pPr>
+            <a:r>
+              <a:rPr lang="fr-FR" dirty="0" err="1" smtClean="0">
+                <a:latin typeface="Courier New" pitchFamily="49" charset="0"/>
+                <a:cs typeface="Courier New" pitchFamily="49" charset="0"/>
+              </a:rPr>
+              <a:t>this_invocation_nonce</a:t>
+            </a:r>
+            <a:endParaRPr lang="fr-FR" dirty="0" smtClean="0">
+              <a:latin typeface="Courier New" pitchFamily="49" charset="0"/>
+              <a:cs typeface="Courier New" pitchFamily="49" charset="0"/>
+            </a:endParaRPr>
+          </a:p>
+          <a:p>
+            <a:pPr>
+              <a:buNone/>
+            </a:pPr>
+            <a:r>
+              <a:rPr lang="fr-FR" dirty="0" smtClean="0">
+                <a:latin typeface="Courier New" pitchFamily="49" charset="0"/>
+                <a:cs typeface="Courier New" pitchFamily="49" charset="0"/>
+              </a:rPr>
+              <a:t>4</a:t>
+            </a:r>
+          </a:p>
+          <a:p>
+            <a:pPr>
+              <a:buNone/>
+            </a:pPr>
+            <a:r>
+              <a:rPr lang="fr-FR" dirty="0" err="1" smtClean="0">
+                <a:latin typeface="Courier New" pitchFamily="49" charset="0"/>
+                <a:cs typeface="Courier New" pitchFamily="49" charset="0"/>
+              </a:rPr>
+              <a:t>perso.test2</a:t>
+            </a:r>
+            <a:r>
+              <a:rPr lang="fr-FR" dirty="0" smtClean="0">
+                <a:latin typeface="Courier New" pitchFamily="49" charset="0"/>
+                <a:cs typeface="Courier New" pitchFamily="49" charset="0"/>
+              </a:rPr>
+              <a:t>.l</a:t>
+            </a:r>
+          </a:p>
+          <a:p>
+            <a:pPr>
+              <a:buNone/>
+            </a:pPr>
+            <a:r>
+              <a:rPr lang="fr-FR" dirty="0" smtClean="0">
+                <a:latin typeface="Courier New" pitchFamily="49" charset="0"/>
+                <a:cs typeface="Courier New" pitchFamily="49" charset="0"/>
+              </a:rPr>
+              <a:t>4</a:t>
+            </a:r>
+          </a:p>
+          <a:p>
+            <a:pPr>
+              <a:buNone/>
+            </a:pPr>
+            <a:r>
+              <a:rPr lang="fr-FR" dirty="0" smtClean="0">
+                <a:latin typeface="Courier New" pitchFamily="49" charset="0"/>
+                <a:cs typeface="Courier New" pitchFamily="49" charset="0"/>
+              </a:rPr>
+              <a:t>1</a:t>
+            </a:r>
+          </a:p>
+          <a:p>
+            <a:pPr>
+              <a:buNone/>
+            </a:pPr>
+            <a:r>
+              <a:rPr lang="fr-FR" dirty="0" err="1" smtClean="0">
+                <a:latin typeface="Courier New" pitchFamily="49" charset="0"/>
+                <a:cs typeface="Courier New" pitchFamily="49" charset="0"/>
+              </a:rPr>
+              <a:t>perso.test2</a:t>
+            </a:r>
+            <a:r>
+              <a:rPr lang="fr-FR" dirty="0" smtClean="0">
+                <a:latin typeface="Courier New" pitchFamily="49" charset="0"/>
+                <a:cs typeface="Courier New" pitchFamily="49" charset="0"/>
+              </a:rPr>
+              <a:t>.i</a:t>
+            </a:r>
+          </a:p>
+          <a:p>
+            <a:pPr>
+              <a:buNone/>
+            </a:pPr>
+            <a:r>
+              <a:rPr lang="fr-FR" dirty="0" smtClean="0">
+                <a:latin typeface="Courier New" pitchFamily="49" charset="0"/>
+                <a:cs typeface="Courier New" pitchFamily="49" charset="0"/>
+              </a:rPr>
+              <a:t>4</a:t>
+            </a:r>
+          </a:p>
+          <a:p>
+            <a:pPr>
+              <a:buNone/>
+            </a:pPr>
+            <a:r>
+              <a:rPr lang="fr-FR" dirty="0" smtClean="0">
+                <a:latin typeface="Courier New" pitchFamily="49" charset="0"/>
+                <a:cs typeface="Courier New" pitchFamily="49" charset="0"/>
+              </a:rPr>
+              <a:t>1</a:t>
+            </a:r>
+          </a:p>
+          <a:p>
+            <a:pPr>
+              <a:buNone/>
+            </a:pPr>
+            <a:r>
+              <a:rPr lang="fr-FR" dirty="0" err="1" smtClean="0">
+                <a:latin typeface="Courier New" pitchFamily="49" charset="0"/>
+                <a:cs typeface="Courier New" pitchFamily="49" charset="0"/>
+              </a:rPr>
+              <a:t>perso.test2</a:t>
+            </a:r>
+            <a:r>
+              <a:rPr lang="fr-FR" dirty="0" smtClean="0">
+                <a:latin typeface="Courier New" pitchFamily="49" charset="0"/>
+                <a:cs typeface="Courier New" pitchFamily="49" charset="0"/>
+              </a:rPr>
+              <a:t>.</a:t>
+            </a:r>
+            <a:r>
+              <a:rPr lang="fr-FR" dirty="0" err="1" smtClean="0">
+                <a:latin typeface="Courier New" pitchFamily="49" charset="0"/>
+                <a:cs typeface="Courier New" pitchFamily="49" charset="0"/>
+              </a:rPr>
+              <a:t>useless</a:t>
+            </a:r>
+            <a:endParaRPr lang="fr-FR" dirty="0" smtClean="0">
+              <a:latin typeface="Courier New" pitchFamily="49" charset="0"/>
+              <a:cs typeface="Courier New" pitchFamily="49" charset="0"/>
+            </a:endParaRPr>
+          </a:p>
+          <a:p>
+            <a:pPr>
+              <a:buNone/>
+            </a:pPr>
+            <a:r>
+              <a:rPr lang="fr-FR" dirty="0" smtClean="0">
+                <a:latin typeface="Courier New" pitchFamily="49" charset="0"/>
+                <a:cs typeface="Courier New" pitchFamily="49" charset="0"/>
+              </a:rPr>
+              <a:t>0</a:t>
+            </a:r>
+          </a:p>
+          <a:p>
+            <a:pPr>
+              <a:buNone/>
+            </a:pPr>
+            <a:r>
+              <a:rPr lang="fr-FR" dirty="0" smtClean="0">
+                <a:latin typeface="Courier New" pitchFamily="49" charset="0"/>
+                <a:cs typeface="Courier New" pitchFamily="49" charset="0"/>
+              </a:rPr>
+              <a:t>1</a:t>
+            </a:r>
+          </a:p>
+          <a:p>
             <a:endParaRPr lang="en-US" dirty="0"/>
           </a:p>
         </p:txBody>
@@ -14325,6 +15464,30 @@
           </a:p>
         </p:txBody>
       </p:sp>
+      <p:sp>
+        <p:nvSpPr>
+          <p:cNvPr id="11" name="Espace réservé du numéro de diapositive 10"/>
+          <p:cNvSpPr>
+            <a:spLocks noGrp="1"/>
+          </p:cNvSpPr>
+          <p:nvPr>
+            <p:ph type="sldNum" sz="quarter" idx="11"/>
+          </p:nvPr>
+        </p:nvSpPr>
+        <p:spPr/>
+        <p:txBody>
+          <a:bodyPr/>
+          <a:lstStyle/>
+          <a:p>
+            <a:fld id="{C59E0035-AE90-440C-AA1E-C825D223288E}" type="slidenum">
+              <a:rPr lang="fr-FR" smtClean="0"/>
+              <a:pPr/>
+              <a:t>5</a:t>
+            </a:fld>
+            <a:endParaRPr lang="fr-FR"/>
+          </a:p>
+        </p:txBody>
+      </p:sp>
     </p:spTree>
   </p:cSld>
   <p:clrMapOvr>
@@ -14439,34 +15602,6 @@
       </p:sp>
       <p:sp>
         <p:nvSpPr>
-          <p:cNvPr id="5" name="Espace réservé du contenu 4"/>
-          <p:cNvSpPr>
-            <a:spLocks noGrp="1"/>
-          </p:cNvSpPr>
-          <p:nvPr>
-            <p:ph sz="quarter" idx="2"/>
-          </p:nvPr>
-        </p:nvSpPr>
-        <p:spPr>
-          <a:xfrm>
-            <a:off x="381000" y="2071678"/>
-            <a:ext cx="4041648" cy="4523041"/>
-          </a:xfrm>
-        </p:spPr>
-        <p:txBody>
-          <a:bodyPr/>
-          <a:lstStyle/>
-          <a:p>
-            <a:r>
-              <a:rPr lang="en-US" dirty="0" smtClean="0"/>
-              <a:t>To do	</a:t>
-            </a:r>
-            <a:endParaRPr lang="en-US" dirty="0"/>
-          </a:p>
-        </p:txBody>
-      </p:sp>
-      <p:sp>
-        <p:nvSpPr>
           <p:cNvPr id="6" name="Espace réservé du contenu 5"/>
           <p:cNvSpPr>
             <a:spLocks noGrp="1"/>
@@ -14477,19 +15612,291 @@
         </p:nvSpPr>
         <p:spPr>
           <a:xfrm>
-            <a:off x="4718304" y="2071678"/>
-            <a:ext cx="4041775" cy="4523041"/>
+            <a:off x="4714876" y="2000240"/>
+            <a:ext cx="4041775" cy="4857760"/>
           </a:xfrm>
         </p:spPr>
         <p:txBody>
-          <a:bodyPr/>
+          <a:bodyPr>
+            <a:noAutofit/>
+          </a:bodyPr>
           <a:lstStyle/>
           <a:p>
-            <a:r>
-              <a:rPr lang="en-US" dirty="0" smtClean="0"/>
-              <a:t>To do</a:t>
-            </a:r>
-            <a:endParaRPr lang="en-US" dirty="0"/>
+            <a:pPr>
+              <a:buNone/>
+            </a:pPr>
+            <a:r>
+              <a:rPr lang="en-US" sz="1100" dirty="0" smtClean="0"/>
+              <a:t>To </a:t>
+            </a:r>
+            <a:r>
+              <a:rPr lang="en-US" sz="1100" dirty="0" err="1" smtClean="0"/>
+              <a:t>doDaikon</a:t>
+            </a:r>
+            <a:r>
+              <a:rPr lang="en-US" sz="1100" dirty="0" smtClean="0"/>
+              <a:t> version 4.5.1, released November 3, 2008; </a:t>
+            </a:r>
+          </a:p>
+          <a:p>
+            <a:pPr>
+              <a:buNone/>
+            </a:pPr>
+            <a:r>
+              <a:rPr lang="en-US" sz="1100" dirty="0" smtClean="0"/>
+              <a:t>Processing trace data; reading 1 </a:t>
+            </a:r>
+            <a:r>
+              <a:rPr lang="en-US" sz="1100" dirty="0" err="1" smtClean="0"/>
+              <a:t>dtrace</a:t>
+            </a:r>
+            <a:r>
+              <a:rPr lang="en-US" sz="1100" dirty="0" smtClean="0"/>
+              <a:t> file:</a:t>
+            </a:r>
+          </a:p>
+          <a:p>
+            <a:pPr>
+              <a:buNone/>
+            </a:pPr>
+            <a:r>
+              <a:rPr lang="en-US" sz="1100" dirty="0" smtClean="0"/>
+              <a:t>[20:52:35]: Finished reading test2.dtrace.gz</a:t>
+            </a:r>
+          </a:p>
+          <a:p>
+            <a:pPr>
+              <a:buNone/>
+            </a:pPr>
+            <a:r>
+              <a:rPr lang="en-US" sz="1100" dirty="0" smtClean="0"/>
+              <a:t>=========================================</a:t>
+            </a:r>
+          </a:p>
+          <a:p>
+            <a:pPr>
+              <a:buNone/>
+            </a:pPr>
+            <a:r>
+              <a:rPr lang="en-US" sz="1100" dirty="0" smtClean="0"/>
+              <a:t>perso.test2:::CLASS</a:t>
+            </a:r>
+          </a:p>
+          <a:p>
+            <a:pPr>
+              <a:buNone/>
+            </a:pPr>
+            <a:r>
+              <a:rPr lang="en-US" sz="1100" dirty="0" smtClean="0"/>
+              <a:t>perso.test2.l == perso.test2.i</a:t>
+            </a:r>
+          </a:p>
+          <a:p>
+            <a:pPr>
+              <a:buNone/>
+            </a:pPr>
+            <a:r>
+              <a:rPr lang="en-US" sz="1100" dirty="0" smtClean="0"/>
+              <a:t>perso.test2.l &gt;= 0</a:t>
+            </a:r>
+          </a:p>
+          <a:p>
+            <a:pPr>
+              <a:buNone/>
+            </a:pPr>
+            <a:r>
+              <a:rPr lang="en-US" sz="1100" dirty="0" smtClean="0"/>
+              <a:t>perso.test2.useless == 0</a:t>
+            </a:r>
+          </a:p>
+          <a:p>
+            <a:pPr>
+              <a:buNone/>
+            </a:pPr>
+            <a:r>
+              <a:rPr lang="en-US" sz="1100" dirty="0" smtClean="0"/>
+              <a:t>perso.test2.l &gt;= perso.test2.useless</a:t>
+            </a:r>
+          </a:p>
+          <a:p>
+            <a:pPr>
+              <a:buNone/>
+            </a:pPr>
+            <a:r>
+              <a:rPr lang="en-US" sz="1100" dirty="0" smtClean="0"/>
+              <a:t>=========================================</a:t>
+            </a:r>
+          </a:p>
+          <a:p>
+            <a:pPr>
+              <a:buNone/>
+            </a:pPr>
+            <a:r>
+              <a:rPr lang="en-US" sz="1100" dirty="0" smtClean="0"/>
+              <a:t>perso.test2.incr():::EXIT</a:t>
+            </a:r>
+          </a:p>
+          <a:p>
+            <a:pPr>
+              <a:buNone/>
+            </a:pPr>
+            <a:r>
+              <a:rPr lang="en-US" sz="1100" dirty="0" smtClean="0"/>
+              <a:t>perso.test2.useless == </a:t>
+            </a:r>
+            <a:r>
+              <a:rPr lang="en-US" sz="1100" dirty="0" err="1" smtClean="0"/>
+              <a:t>orig</a:t>
+            </a:r>
+            <a:r>
+              <a:rPr lang="en-US" sz="1100" dirty="0" smtClean="0"/>
+              <a:t>(perso.test2.useless)</a:t>
+            </a:r>
+          </a:p>
+          <a:p>
+            <a:pPr>
+              <a:buNone/>
+            </a:pPr>
+            <a:r>
+              <a:rPr lang="en-US" sz="1100" dirty="0" smtClean="0"/>
+              <a:t>perso.test2.l &gt; perso.test2.useless</a:t>
+            </a:r>
+          </a:p>
+          <a:p>
+            <a:pPr>
+              <a:buNone/>
+            </a:pPr>
+            <a:r>
+              <a:rPr lang="en-US" sz="1100" dirty="0" smtClean="0"/>
+              <a:t>perso.test2.l - </a:t>
+            </a:r>
+            <a:r>
+              <a:rPr lang="en-US" sz="1100" dirty="0" err="1" smtClean="0"/>
+              <a:t>orig</a:t>
+            </a:r>
+            <a:r>
+              <a:rPr lang="en-US" sz="1100" dirty="0" smtClean="0"/>
+              <a:t>(perso.test2.l) - 1 == 0</a:t>
+            </a:r>
+          </a:p>
+          <a:p>
+            <a:pPr>
+              <a:buNone/>
+            </a:pPr>
+            <a:r>
+              <a:rPr lang="en-US" sz="1100" dirty="0" smtClean="0"/>
+              <a:t>perso.test2.useless &lt;= </a:t>
+            </a:r>
+            <a:r>
+              <a:rPr lang="en-US" sz="1100" dirty="0" err="1" smtClean="0"/>
+              <a:t>orig</a:t>
+            </a:r>
+            <a:r>
+              <a:rPr lang="en-US" sz="1100" dirty="0" smtClean="0"/>
+              <a:t>(perso.test2.l)</a:t>
+            </a:r>
+          </a:p>
+          <a:p>
+            <a:pPr>
+              <a:buNone/>
+            </a:pPr>
+            <a:r>
+              <a:rPr lang="en-US" sz="1100" dirty="0" smtClean="0"/>
+              <a:t>=========================================</a:t>
+            </a:r>
+          </a:p>
+          <a:p>
+            <a:pPr>
+              <a:buNone/>
+            </a:pPr>
+            <a:r>
+              <a:rPr lang="en-US" sz="1100" dirty="0" smtClean="0"/>
+              <a:t>perso.test2.main(</a:t>
+            </a:r>
+            <a:r>
+              <a:rPr lang="en-US" sz="1100" dirty="0" err="1" smtClean="0"/>
+              <a:t>java.lang.String</a:t>
+            </a:r>
+            <a:r>
+              <a:rPr lang="en-US" sz="1100" dirty="0" smtClean="0"/>
+              <a:t>[]):::ENTER</a:t>
+            </a:r>
+          </a:p>
+          <a:p>
+            <a:pPr>
+              <a:buNone/>
+            </a:pPr>
+            <a:r>
+              <a:rPr lang="en-US" sz="1100" dirty="0" smtClean="0"/>
+              <a:t>perso.test2.l == perso.test2.useless</a:t>
+            </a:r>
+          </a:p>
+          <a:p>
+            <a:pPr>
+              <a:buNone/>
+            </a:pPr>
+            <a:r>
+              <a:rPr lang="en-US" sz="1100" dirty="0" smtClean="0"/>
+              <a:t>perso.test2.l == size(arg0[])</a:t>
+            </a:r>
+          </a:p>
+          <a:p>
+            <a:pPr>
+              <a:buNone/>
+            </a:pPr>
+            <a:r>
+              <a:rPr lang="en-US" sz="1100" dirty="0" smtClean="0"/>
+              <a:t>arg0 has only one value</a:t>
+            </a:r>
+          </a:p>
+          <a:p>
+            <a:pPr>
+              <a:buNone/>
+            </a:pPr>
+            <a:r>
+              <a:rPr lang="en-US" sz="1100" dirty="0" smtClean="0"/>
+              <a:t>arg0.getClass() == </a:t>
+            </a:r>
+            <a:r>
+              <a:rPr lang="en-US" sz="1100" dirty="0" err="1" smtClean="0"/>
+              <a:t>java.lang.String</a:t>
+            </a:r>
+            <a:r>
+              <a:rPr lang="en-US" sz="1100" dirty="0" smtClean="0"/>
+              <a:t>[].class</a:t>
+            </a:r>
+          </a:p>
+          <a:p>
+            <a:pPr>
+              <a:buNone/>
+            </a:pPr>
+            <a:r>
+              <a:rPr lang="en-US" sz="1100" dirty="0" smtClean="0"/>
+              <a:t>arg0[] == []</a:t>
+            </a:r>
+          </a:p>
+          <a:p>
+            <a:pPr>
+              <a:buNone/>
+            </a:pPr>
+            <a:r>
+              <a:rPr lang="en-US" sz="1100" dirty="0" smtClean="0"/>
+              <a:t>arg0[].</a:t>
+            </a:r>
+            <a:r>
+              <a:rPr lang="en-US" sz="1100" dirty="0" err="1" smtClean="0"/>
+              <a:t>toString</a:t>
+            </a:r>
+            <a:r>
+              <a:rPr lang="en-US" sz="1100" dirty="0" smtClean="0"/>
+              <a:t> == []</a:t>
+            </a:r>
+          </a:p>
+          <a:p>
+            <a:pPr>
+              <a:buNone/>
+            </a:pPr>
+            <a:endParaRPr lang="en-US" sz="1100" dirty="0"/>
           </a:p>
         </p:txBody>
       </p:sp>
@@ -14573,6 +15980,1330 @@
           </a:p>
         </p:txBody>
       </p:sp>
+      <p:sp>
+        <p:nvSpPr>
+          <p:cNvPr id="10" name="Espace réservé du contenu 9"/>
+          <p:cNvSpPr txBox="1">
+            <a:spLocks/>
+          </p:cNvSpPr>
+          <p:nvPr/>
+        </p:nvSpPr>
+        <p:spPr>
+          <a:xfrm>
+            <a:off x="428596" y="2143116"/>
+            <a:ext cx="4041775" cy="4523041"/>
+          </a:xfrm>
+          <a:prstGeom prst="rect">
+            <a:avLst/>
+          </a:prstGeom>
+        </p:spPr>
+        <p:txBody>
+          <a:bodyPr vert="horz">
+            <a:normAutofit fontScale="55000" lnSpcReduction="20000"/>
+          </a:bodyPr>
+          <a:lstStyle/>
+          <a:p>
+            <a:pPr marL="365760" marR="0" lvl="0" indent="-256032" algn="l" defTabSz="914400" rtl="0" eaLnBrk="1" fontAlgn="auto" latinLnBrk="0" hangingPunct="1">
+              <a:lnSpc>
+                <a:spcPct val="100000"/>
+              </a:lnSpc>
+              <a:spcBef>
+                <a:spcPts val="300"/>
+              </a:spcBef>
+              <a:spcAft>
+                <a:spcPts val="0"/>
+              </a:spcAft>
+              <a:buClr>
+                <a:schemeClr val="accent3"/>
+              </a:buClr>
+              <a:buSzTx/>
+              <a:buFont typeface="Georgia"/>
+              <a:buNone/>
+              <a:tabLst/>
+              <a:defRPr/>
+            </a:pPr>
+            <a:r>
+              <a:rPr kumimoji="0" lang="fr-FR" sz="2000" b="0" i="0" u="none" strike="noStrike" kern="1200" cap="none" spc="0" normalizeH="0" baseline="0" noProof="0" dirty="0" err="1" smtClean="0">
+                <a:ln>
+                  <a:noFill/>
+                </a:ln>
+                <a:solidFill>
+                  <a:schemeClr val="tx1"/>
+                </a:solidFill>
+                <a:effectLst/>
+                <a:uLnTx/>
+                <a:uFillTx/>
+                <a:latin typeface="Courier New" pitchFamily="49" charset="0"/>
+                <a:ea typeface="+mn-ea"/>
+                <a:cs typeface="Courier New" pitchFamily="49" charset="0"/>
+              </a:rPr>
+              <a:t>perso.test2</a:t>
+            </a:r>
+            <a:r>
+              <a:rPr kumimoji="0" lang="fr-FR" sz="2000" b="0" i="0" u="none" strike="noStrike" kern="1200" cap="none" spc="0" normalizeH="0" baseline="0" noProof="0" dirty="0" smtClean="0">
+                <a:ln>
+                  <a:noFill/>
+                </a:ln>
+                <a:solidFill>
+                  <a:schemeClr val="tx1"/>
+                </a:solidFill>
+                <a:effectLst/>
+                <a:uLnTx/>
+                <a:uFillTx/>
+                <a:latin typeface="Courier New" pitchFamily="49" charset="0"/>
+                <a:ea typeface="+mn-ea"/>
+                <a:cs typeface="Courier New" pitchFamily="49" charset="0"/>
+              </a:rPr>
+              <a:t>.</a:t>
+            </a:r>
+            <a:r>
+              <a:rPr kumimoji="0" lang="fr-FR" sz="2000" b="0" i="0" u="none" strike="noStrike" kern="1200" cap="none" spc="0" normalizeH="0" baseline="0" noProof="0" dirty="0" err="1" smtClean="0">
+                <a:ln>
+                  <a:noFill/>
+                </a:ln>
+                <a:solidFill>
+                  <a:schemeClr val="tx1"/>
+                </a:solidFill>
+                <a:effectLst/>
+                <a:uLnTx/>
+                <a:uFillTx/>
+                <a:latin typeface="Courier New" pitchFamily="49" charset="0"/>
+                <a:ea typeface="+mn-ea"/>
+                <a:cs typeface="Courier New" pitchFamily="49" charset="0"/>
+              </a:rPr>
+              <a:t>incr</a:t>
+            </a:r>
+            <a:r>
+              <a:rPr kumimoji="0" lang="fr-FR" sz="2000" b="0" i="0" u="none" strike="noStrike" kern="1200" cap="none" spc="0" normalizeH="0" baseline="0" noProof="0" dirty="0" smtClean="0">
+                <a:ln>
+                  <a:noFill/>
+                </a:ln>
+                <a:solidFill>
+                  <a:schemeClr val="tx1"/>
+                </a:solidFill>
+                <a:effectLst/>
+                <a:uLnTx/>
+                <a:uFillTx/>
+                <a:latin typeface="Courier New" pitchFamily="49" charset="0"/>
+                <a:ea typeface="+mn-ea"/>
+                <a:cs typeface="Courier New" pitchFamily="49" charset="0"/>
+              </a:rPr>
+              <a:t>():::ENTER</a:t>
+            </a:r>
+          </a:p>
+          <a:p>
+            <a:pPr marL="365760" marR="0" lvl="0" indent="-256032" algn="l" defTabSz="914400" rtl="0" eaLnBrk="1" fontAlgn="auto" latinLnBrk="0" hangingPunct="1">
+              <a:lnSpc>
+                <a:spcPct val="100000"/>
+              </a:lnSpc>
+              <a:spcBef>
+                <a:spcPts val="300"/>
+              </a:spcBef>
+              <a:spcAft>
+                <a:spcPts val="0"/>
+              </a:spcAft>
+              <a:buClr>
+                <a:schemeClr val="accent3"/>
+              </a:buClr>
+              <a:buSzTx/>
+              <a:buFont typeface="Georgia"/>
+              <a:buNone/>
+              <a:tabLst/>
+              <a:defRPr/>
+            </a:pPr>
+            <a:r>
+              <a:rPr kumimoji="0" lang="fr-FR" sz="2000" b="0" i="0" u="none" strike="noStrike" kern="1200" cap="none" spc="0" normalizeH="0" baseline="0" noProof="0" dirty="0" err="1" smtClean="0">
+                <a:ln>
+                  <a:noFill/>
+                </a:ln>
+                <a:solidFill>
+                  <a:schemeClr val="tx1"/>
+                </a:solidFill>
+                <a:effectLst/>
+                <a:uLnTx/>
+                <a:uFillTx/>
+                <a:latin typeface="Courier New" pitchFamily="49" charset="0"/>
+                <a:ea typeface="+mn-ea"/>
+                <a:cs typeface="Courier New" pitchFamily="49" charset="0"/>
+              </a:rPr>
+              <a:t>this_invocation_nonce</a:t>
+            </a:r>
+            <a:endParaRPr kumimoji="0" lang="fr-FR" sz="2000" b="0" i="0" u="none" strike="noStrike" kern="1200" cap="none" spc="0" normalizeH="0" baseline="0" noProof="0" dirty="0" smtClean="0">
+              <a:ln>
+                <a:noFill/>
+              </a:ln>
+              <a:solidFill>
+                <a:schemeClr val="tx1"/>
+              </a:solidFill>
+              <a:effectLst/>
+              <a:uLnTx/>
+              <a:uFillTx/>
+              <a:latin typeface="Courier New" pitchFamily="49" charset="0"/>
+              <a:ea typeface="+mn-ea"/>
+              <a:cs typeface="Courier New" pitchFamily="49" charset="0"/>
+            </a:endParaRPr>
+          </a:p>
+          <a:p>
+            <a:pPr marL="365760" marR="0" lvl="0" indent="-256032" algn="l" defTabSz="914400" rtl="0" eaLnBrk="1" fontAlgn="auto" latinLnBrk="0" hangingPunct="1">
+              <a:lnSpc>
+                <a:spcPct val="100000"/>
+              </a:lnSpc>
+              <a:spcBef>
+                <a:spcPts val="300"/>
+              </a:spcBef>
+              <a:spcAft>
+                <a:spcPts val="0"/>
+              </a:spcAft>
+              <a:buClr>
+                <a:schemeClr val="accent3"/>
+              </a:buClr>
+              <a:buSzTx/>
+              <a:buFont typeface="Georgia"/>
+              <a:buNone/>
+              <a:tabLst/>
+              <a:defRPr/>
+            </a:pPr>
+            <a:r>
+              <a:rPr kumimoji="0" lang="fr-FR" sz="2000" b="0" i="0" u="none" strike="noStrike" kern="1200" cap="none" spc="0" normalizeH="0" baseline="0" noProof="0" dirty="0" smtClean="0">
+                <a:ln>
+                  <a:noFill/>
+                </a:ln>
+                <a:solidFill>
+                  <a:schemeClr val="tx1"/>
+                </a:solidFill>
+                <a:effectLst/>
+                <a:uLnTx/>
+                <a:uFillTx/>
+                <a:latin typeface="Courier New" pitchFamily="49" charset="0"/>
+                <a:ea typeface="+mn-ea"/>
+                <a:cs typeface="Courier New" pitchFamily="49" charset="0"/>
+              </a:rPr>
+              <a:t>4</a:t>
+            </a:r>
+          </a:p>
+          <a:p>
+            <a:pPr marL="365760" marR="0" lvl="0" indent="-256032" algn="l" defTabSz="914400" rtl="0" eaLnBrk="1" fontAlgn="auto" latinLnBrk="0" hangingPunct="1">
+              <a:lnSpc>
+                <a:spcPct val="100000"/>
+              </a:lnSpc>
+              <a:spcBef>
+                <a:spcPts val="300"/>
+              </a:spcBef>
+              <a:spcAft>
+                <a:spcPts val="0"/>
+              </a:spcAft>
+              <a:buClr>
+                <a:schemeClr val="accent3"/>
+              </a:buClr>
+              <a:buSzTx/>
+              <a:buFont typeface="Georgia"/>
+              <a:buNone/>
+              <a:tabLst/>
+              <a:defRPr/>
+            </a:pPr>
+            <a:r>
+              <a:rPr kumimoji="0" lang="fr-FR" sz="2000" b="0" i="0" u="none" strike="noStrike" kern="1200" cap="none" spc="0" normalizeH="0" baseline="0" noProof="0" dirty="0" err="1" smtClean="0">
+                <a:ln>
+                  <a:noFill/>
+                </a:ln>
+                <a:solidFill>
+                  <a:schemeClr val="tx1"/>
+                </a:solidFill>
+                <a:effectLst/>
+                <a:uLnTx/>
+                <a:uFillTx/>
+                <a:latin typeface="Courier New" pitchFamily="49" charset="0"/>
+                <a:ea typeface="+mn-ea"/>
+                <a:cs typeface="Courier New" pitchFamily="49" charset="0"/>
+              </a:rPr>
+              <a:t>perso.test2</a:t>
+            </a:r>
+            <a:r>
+              <a:rPr kumimoji="0" lang="fr-FR" sz="2000" b="0" i="0" u="none" strike="noStrike" kern="1200" cap="none" spc="0" normalizeH="0" baseline="0" noProof="0" dirty="0" smtClean="0">
+                <a:ln>
+                  <a:noFill/>
+                </a:ln>
+                <a:solidFill>
+                  <a:schemeClr val="tx1"/>
+                </a:solidFill>
+                <a:effectLst/>
+                <a:uLnTx/>
+                <a:uFillTx/>
+                <a:latin typeface="Courier New" pitchFamily="49" charset="0"/>
+                <a:ea typeface="+mn-ea"/>
+                <a:cs typeface="Courier New" pitchFamily="49" charset="0"/>
+              </a:rPr>
+              <a:t>.l</a:t>
+            </a:r>
+          </a:p>
+          <a:p>
+            <a:pPr marL="365760" marR="0" lvl="0" indent="-256032" algn="l" defTabSz="914400" rtl="0" eaLnBrk="1" fontAlgn="auto" latinLnBrk="0" hangingPunct="1">
+              <a:lnSpc>
+                <a:spcPct val="100000"/>
+              </a:lnSpc>
+              <a:spcBef>
+                <a:spcPts val="300"/>
+              </a:spcBef>
+              <a:spcAft>
+                <a:spcPts val="0"/>
+              </a:spcAft>
+              <a:buClr>
+                <a:schemeClr val="accent3"/>
+              </a:buClr>
+              <a:buSzTx/>
+              <a:buFont typeface="Georgia"/>
+              <a:buNone/>
+              <a:tabLst/>
+              <a:defRPr/>
+            </a:pPr>
+            <a:r>
+              <a:rPr kumimoji="0" lang="fr-FR" sz="2000" b="0" i="0" u="none" strike="noStrike" kern="1200" cap="none" spc="0" normalizeH="0" baseline="0" noProof="0" dirty="0" smtClean="0">
+                <a:ln>
+                  <a:noFill/>
+                </a:ln>
+                <a:solidFill>
+                  <a:schemeClr val="tx1"/>
+                </a:solidFill>
+                <a:effectLst/>
+                <a:uLnTx/>
+                <a:uFillTx/>
+                <a:latin typeface="Courier New" pitchFamily="49" charset="0"/>
+                <a:ea typeface="+mn-ea"/>
+                <a:cs typeface="Courier New" pitchFamily="49" charset="0"/>
+              </a:rPr>
+              <a:t>3</a:t>
+            </a:r>
+          </a:p>
+          <a:p>
+            <a:pPr marL="365760" marR="0" lvl="0" indent="-256032" algn="l" defTabSz="914400" rtl="0" eaLnBrk="1" fontAlgn="auto" latinLnBrk="0" hangingPunct="1">
+              <a:lnSpc>
+                <a:spcPct val="100000"/>
+              </a:lnSpc>
+              <a:spcBef>
+                <a:spcPts val="300"/>
+              </a:spcBef>
+              <a:spcAft>
+                <a:spcPts val="0"/>
+              </a:spcAft>
+              <a:buClr>
+                <a:schemeClr val="accent3"/>
+              </a:buClr>
+              <a:buSzTx/>
+              <a:buFont typeface="Georgia"/>
+              <a:buNone/>
+              <a:tabLst/>
+              <a:defRPr/>
+            </a:pPr>
+            <a:r>
+              <a:rPr kumimoji="0" lang="fr-FR" sz="2000" b="0" i="0" u="none" strike="noStrike" kern="1200" cap="none" spc="0" normalizeH="0" baseline="0" noProof="0" dirty="0" smtClean="0">
+                <a:ln>
+                  <a:noFill/>
+                </a:ln>
+                <a:solidFill>
+                  <a:schemeClr val="tx1"/>
+                </a:solidFill>
+                <a:effectLst/>
+                <a:uLnTx/>
+                <a:uFillTx/>
+                <a:latin typeface="Courier New" pitchFamily="49" charset="0"/>
+                <a:ea typeface="+mn-ea"/>
+                <a:cs typeface="Courier New" pitchFamily="49" charset="0"/>
+              </a:rPr>
+              <a:t>1</a:t>
+            </a:r>
+          </a:p>
+          <a:p>
+            <a:pPr marL="365760" marR="0" lvl="0" indent="-256032" algn="l" defTabSz="914400" rtl="0" eaLnBrk="1" fontAlgn="auto" latinLnBrk="0" hangingPunct="1">
+              <a:lnSpc>
+                <a:spcPct val="100000"/>
+              </a:lnSpc>
+              <a:spcBef>
+                <a:spcPts val="300"/>
+              </a:spcBef>
+              <a:spcAft>
+                <a:spcPts val="0"/>
+              </a:spcAft>
+              <a:buClr>
+                <a:schemeClr val="accent3"/>
+              </a:buClr>
+              <a:buSzTx/>
+              <a:buFont typeface="Georgia"/>
+              <a:buNone/>
+              <a:tabLst/>
+              <a:defRPr/>
+            </a:pPr>
+            <a:r>
+              <a:rPr kumimoji="0" lang="fr-FR" sz="2000" b="0" i="0" u="none" strike="noStrike" kern="1200" cap="none" spc="0" normalizeH="0" baseline="0" noProof="0" dirty="0" err="1" smtClean="0">
+                <a:ln>
+                  <a:noFill/>
+                </a:ln>
+                <a:solidFill>
+                  <a:schemeClr val="tx1"/>
+                </a:solidFill>
+                <a:effectLst/>
+                <a:uLnTx/>
+                <a:uFillTx/>
+                <a:latin typeface="Courier New" pitchFamily="49" charset="0"/>
+                <a:ea typeface="+mn-ea"/>
+                <a:cs typeface="Courier New" pitchFamily="49" charset="0"/>
+              </a:rPr>
+              <a:t>perso.test2</a:t>
+            </a:r>
+            <a:r>
+              <a:rPr kumimoji="0" lang="fr-FR" sz="2000" b="0" i="0" u="none" strike="noStrike" kern="1200" cap="none" spc="0" normalizeH="0" baseline="0" noProof="0" dirty="0" smtClean="0">
+                <a:ln>
+                  <a:noFill/>
+                </a:ln>
+                <a:solidFill>
+                  <a:schemeClr val="tx1"/>
+                </a:solidFill>
+                <a:effectLst/>
+                <a:uLnTx/>
+                <a:uFillTx/>
+                <a:latin typeface="Courier New" pitchFamily="49" charset="0"/>
+                <a:ea typeface="+mn-ea"/>
+                <a:cs typeface="Courier New" pitchFamily="49" charset="0"/>
+              </a:rPr>
+              <a:t>.i</a:t>
+            </a:r>
+          </a:p>
+          <a:p>
+            <a:pPr marL="365760" marR="0" lvl="0" indent="-256032" algn="l" defTabSz="914400" rtl="0" eaLnBrk="1" fontAlgn="auto" latinLnBrk="0" hangingPunct="1">
+              <a:lnSpc>
+                <a:spcPct val="100000"/>
+              </a:lnSpc>
+              <a:spcBef>
+                <a:spcPts val="300"/>
+              </a:spcBef>
+              <a:spcAft>
+                <a:spcPts val="0"/>
+              </a:spcAft>
+              <a:buClr>
+                <a:schemeClr val="accent3"/>
+              </a:buClr>
+              <a:buSzTx/>
+              <a:buFont typeface="Georgia"/>
+              <a:buNone/>
+              <a:tabLst/>
+              <a:defRPr/>
+            </a:pPr>
+            <a:r>
+              <a:rPr kumimoji="0" lang="fr-FR" sz="2000" b="0" i="0" u="none" strike="noStrike" kern="1200" cap="none" spc="0" normalizeH="0" baseline="0" noProof="0" dirty="0" smtClean="0">
+                <a:ln>
+                  <a:noFill/>
+                </a:ln>
+                <a:solidFill>
+                  <a:schemeClr val="tx1"/>
+                </a:solidFill>
+                <a:effectLst/>
+                <a:uLnTx/>
+                <a:uFillTx/>
+                <a:latin typeface="Courier New" pitchFamily="49" charset="0"/>
+                <a:ea typeface="+mn-ea"/>
+                <a:cs typeface="Courier New" pitchFamily="49" charset="0"/>
+              </a:rPr>
+              <a:t>3</a:t>
+            </a:r>
+          </a:p>
+          <a:p>
+            <a:pPr marL="365760" marR="0" lvl="0" indent="-256032" algn="l" defTabSz="914400" rtl="0" eaLnBrk="1" fontAlgn="auto" latinLnBrk="0" hangingPunct="1">
+              <a:lnSpc>
+                <a:spcPct val="100000"/>
+              </a:lnSpc>
+              <a:spcBef>
+                <a:spcPts val="300"/>
+              </a:spcBef>
+              <a:spcAft>
+                <a:spcPts val="0"/>
+              </a:spcAft>
+              <a:buClr>
+                <a:schemeClr val="accent3"/>
+              </a:buClr>
+              <a:buSzTx/>
+              <a:buFont typeface="Georgia"/>
+              <a:buNone/>
+              <a:tabLst/>
+              <a:defRPr/>
+            </a:pPr>
+            <a:r>
+              <a:rPr kumimoji="0" lang="fr-FR" sz="2000" b="0" i="0" u="none" strike="noStrike" kern="1200" cap="none" spc="0" normalizeH="0" baseline="0" noProof="0" dirty="0" smtClean="0">
+                <a:ln>
+                  <a:noFill/>
+                </a:ln>
+                <a:solidFill>
+                  <a:schemeClr val="tx1"/>
+                </a:solidFill>
+                <a:effectLst/>
+                <a:uLnTx/>
+                <a:uFillTx/>
+                <a:latin typeface="Courier New" pitchFamily="49" charset="0"/>
+                <a:ea typeface="+mn-ea"/>
+                <a:cs typeface="Courier New" pitchFamily="49" charset="0"/>
+              </a:rPr>
+              <a:t>1</a:t>
+            </a:r>
+          </a:p>
+          <a:p>
+            <a:pPr marL="365760" marR="0" lvl="0" indent="-256032" algn="l" defTabSz="914400" rtl="0" eaLnBrk="1" fontAlgn="auto" latinLnBrk="0" hangingPunct="1">
+              <a:lnSpc>
+                <a:spcPct val="100000"/>
+              </a:lnSpc>
+              <a:spcBef>
+                <a:spcPts val="300"/>
+              </a:spcBef>
+              <a:spcAft>
+                <a:spcPts val="0"/>
+              </a:spcAft>
+              <a:buClr>
+                <a:schemeClr val="accent3"/>
+              </a:buClr>
+              <a:buSzTx/>
+              <a:buFont typeface="Georgia"/>
+              <a:buNone/>
+              <a:tabLst/>
+              <a:defRPr/>
+            </a:pPr>
+            <a:r>
+              <a:rPr kumimoji="0" lang="fr-FR" sz="2000" b="0" i="0" u="none" strike="noStrike" kern="1200" cap="none" spc="0" normalizeH="0" baseline="0" noProof="0" dirty="0" err="1" smtClean="0">
+                <a:ln>
+                  <a:noFill/>
+                </a:ln>
+                <a:solidFill>
+                  <a:schemeClr val="tx1"/>
+                </a:solidFill>
+                <a:effectLst/>
+                <a:uLnTx/>
+                <a:uFillTx/>
+                <a:latin typeface="Courier New" pitchFamily="49" charset="0"/>
+                <a:ea typeface="+mn-ea"/>
+                <a:cs typeface="Courier New" pitchFamily="49" charset="0"/>
+              </a:rPr>
+              <a:t>perso.test2</a:t>
+            </a:r>
+            <a:r>
+              <a:rPr kumimoji="0" lang="fr-FR" sz="2000" b="0" i="0" u="none" strike="noStrike" kern="1200" cap="none" spc="0" normalizeH="0" baseline="0" noProof="0" dirty="0" smtClean="0">
+                <a:ln>
+                  <a:noFill/>
+                </a:ln>
+                <a:solidFill>
+                  <a:schemeClr val="tx1"/>
+                </a:solidFill>
+                <a:effectLst/>
+                <a:uLnTx/>
+                <a:uFillTx/>
+                <a:latin typeface="Courier New" pitchFamily="49" charset="0"/>
+                <a:ea typeface="+mn-ea"/>
+                <a:cs typeface="Courier New" pitchFamily="49" charset="0"/>
+              </a:rPr>
+              <a:t>.</a:t>
+            </a:r>
+            <a:r>
+              <a:rPr kumimoji="0" lang="fr-FR" sz="2000" b="0" i="0" u="none" strike="noStrike" kern="1200" cap="none" spc="0" normalizeH="0" baseline="0" noProof="0" dirty="0" err="1" smtClean="0">
+                <a:ln>
+                  <a:noFill/>
+                </a:ln>
+                <a:solidFill>
+                  <a:schemeClr val="tx1"/>
+                </a:solidFill>
+                <a:effectLst/>
+                <a:uLnTx/>
+                <a:uFillTx/>
+                <a:latin typeface="Courier New" pitchFamily="49" charset="0"/>
+                <a:ea typeface="+mn-ea"/>
+                <a:cs typeface="Courier New" pitchFamily="49" charset="0"/>
+              </a:rPr>
+              <a:t>useless</a:t>
+            </a:r>
+            <a:endParaRPr kumimoji="0" lang="fr-FR" sz="2000" b="0" i="0" u="none" strike="noStrike" kern="1200" cap="none" spc="0" normalizeH="0" baseline="0" noProof="0" dirty="0" smtClean="0">
+              <a:ln>
+                <a:noFill/>
+              </a:ln>
+              <a:solidFill>
+                <a:schemeClr val="tx1"/>
+              </a:solidFill>
+              <a:effectLst/>
+              <a:uLnTx/>
+              <a:uFillTx/>
+              <a:latin typeface="Courier New" pitchFamily="49" charset="0"/>
+              <a:ea typeface="+mn-ea"/>
+              <a:cs typeface="Courier New" pitchFamily="49" charset="0"/>
+            </a:endParaRPr>
+          </a:p>
+          <a:p>
+            <a:pPr marL="365760" marR="0" lvl="0" indent="-256032" algn="l" defTabSz="914400" rtl="0" eaLnBrk="1" fontAlgn="auto" latinLnBrk="0" hangingPunct="1">
+              <a:lnSpc>
+                <a:spcPct val="100000"/>
+              </a:lnSpc>
+              <a:spcBef>
+                <a:spcPts val="300"/>
+              </a:spcBef>
+              <a:spcAft>
+                <a:spcPts val="0"/>
+              </a:spcAft>
+              <a:buClr>
+                <a:schemeClr val="accent3"/>
+              </a:buClr>
+              <a:buSzTx/>
+              <a:buFont typeface="Georgia"/>
+              <a:buNone/>
+              <a:tabLst/>
+              <a:defRPr/>
+            </a:pPr>
+            <a:r>
+              <a:rPr kumimoji="0" lang="fr-FR" sz="2000" b="0" i="0" u="none" strike="noStrike" kern="1200" cap="none" spc="0" normalizeH="0" baseline="0" noProof="0" dirty="0" smtClean="0">
+                <a:ln>
+                  <a:noFill/>
+                </a:ln>
+                <a:solidFill>
+                  <a:schemeClr val="tx1"/>
+                </a:solidFill>
+                <a:effectLst/>
+                <a:uLnTx/>
+                <a:uFillTx/>
+                <a:latin typeface="Courier New" pitchFamily="49" charset="0"/>
+                <a:ea typeface="+mn-ea"/>
+                <a:cs typeface="Courier New" pitchFamily="49" charset="0"/>
+              </a:rPr>
+              <a:t>0</a:t>
+            </a:r>
+          </a:p>
+          <a:p>
+            <a:pPr marL="365760" marR="0" lvl="0" indent="-256032" algn="l" defTabSz="914400" rtl="0" eaLnBrk="1" fontAlgn="auto" latinLnBrk="0" hangingPunct="1">
+              <a:lnSpc>
+                <a:spcPct val="100000"/>
+              </a:lnSpc>
+              <a:spcBef>
+                <a:spcPts val="300"/>
+              </a:spcBef>
+              <a:spcAft>
+                <a:spcPts val="0"/>
+              </a:spcAft>
+              <a:buClr>
+                <a:schemeClr val="accent3"/>
+              </a:buClr>
+              <a:buSzTx/>
+              <a:buFont typeface="Georgia"/>
+              <a:buNone/>
+              <a:tabLst/>
+              <a:defRPr/>
+            </a:pPr>
+            <a:r>
+              <a:rPr kumimoji="0" lang="fr-FR" sz="2000" b="0" i="0" u="none" strike="noStrike" kern="1200" cap="none" spc="0" normalizeH="0" baseline="0" noProof="0" dirty="0" smtClean="0">
+                <a:ln>
+                  <a:noFill/>
+                </a:ln>
+                <a:solidFill>
+                  <a:schemeClr val="tx1"/>
+                </a:solidFill>
+                <a:effectLst/>
+                <a:uLnTx/>
+                <a:uFillTx/>
+                <a:latin typeface="Courier New" pitchFamily="49" charset="0"/>
+                <a:ea typeface="+mn-ea"/>
+                <a:cs typeface="Courier New" pitchFamily="49" charset="0"/>
+              </a:rPr>
+              <a:t>1</a:t>
+            </a:r>
+          </a:p>
+          <a:p>
+            <a:pPr marL="365760" marR="0" lvl="0" indent="-256032" algn="l" defTabSz="914400" rtl="0" eaLnBrk="1" fontAlgn="auto" latinLnBrk="0" hangingPunct="1">
+              <a:lnSpc>
+                <a:spcPct val="100000"/>
+              </a:lnSpc>
+              <a:spcBef>
+                <a:spcPts val="300"/>
+              </a:spcBef>
+              <a:spcAft>
+                <a:spcPts val="0"/>
+              </a:spcAft>
+              <a:buClr>
+                <a:schemeClr val="accent3"/>
+              </a:buClr>
+              <a:buSzTx/>
+              <a:buFont typeface="Georgia"/>
+              <a:buNone/>
+              <a:tabLst/>
+              <a:defRPr/>
+            </a:pPr>
+            <a:endParaRPr kumimoji="0" lang="fr-FR" sz="2000" b="0" i="0" u="none" strike="noStrike" kern="1200" cap="none" spc="0" normalizeH="0" baseline="0" noProof="0" dirty="0" smtClean="0">
+              <a:ln>
+                <a:noFill/>
+              </a:ln>
+              <a:solidFill>
+                <a:schemeClr val="tx1"/>
+              </a:solidFill>
+              <a:effectLst/>
+              <a:uLnTx/>
+              <a:uFillTx/>
+              <a:latin typeface="Courier New" pitchFamily="49" charset="0"/>
+              <a:ea typeface="+mn-ea"/>
+              <a:cs typeface="Courier New" pitchFamily="49" charset="0"/>
+            </a:endParaRPr>
+          </a:p>
+          <a:p>
+            <a:pPr marL="365760" marR="0" lvl="0" indent="-256032" algn="l" defTabSz="914400" rtl="0" eaLnBrk="1" fontAlgn="auto" latinLnBrk="0" hangingPunct="1">
+              <a:lnSpc>
+                <a:spcPct val="100000"/>
+              </a:lnSpc>
+              <a:spcBef>
+                <a:spcPts val="300"/>
+              </a:spcBef>
+              <a:spcAft>
+                <a:spcPts val="0"/>
+              </a:spcAft>
+              <a:buClr>
+                <a:schemeClr val="accent3"/>
+              </a:buClr>
+              <a:buSzTx/>
+              <a:buFont typeface="Georgia"/>
+              <a:buNone/>
+              <a:tabLst/>
+              <a:defRPr/>
+            </a:pPr>
+            <a:r>
+              <a:rPr kumimoji="0" lang="fr-FR" sz="2000" b="0" i="0" u="none" strike="noStrike" kern="1200" cap="none" spc="0" normalizeH="0" baseline="0" noProof="0" dirty="0" err="1" smtClean="0">
+                <a:ln>
+                  <a:noFill/>
+                </a:ln>
+                <a:solidFill>
+                  <a:schemeClr val="tx1"/>
+                </a:solidFill>
+                <a:effectLst/>
+                <a:uLnTx/>
+                <a:uFillTx/>
+                <a:latin typeface="Courier New" pitchFamily="49" charset="0"/>
+                <a:ea typeface="+mn-ea"/>
+                <a:cs typeface="Courier New" pitchFamily="49" charset="0"/>
+              </a:rPr>
+              <a:t>perso.test2</a:t>
+            </a:r>
+            <a:r>
+              <a:rPr kumimoji="0" lang="fr-FR" sz="2000" b="0" i="0" u="none" strike="noStrike" kern="1200" cap="none" spc="0" normalizeH="0" baseline="0" noProof="0" dirty="0" smtClean="0">
+                <a:ln>
+                  <a:noFill/>
+                </a:ln>
+                <a:solidFill>
+                  <a:schemeClr val="tx1"/>
+                </a:solidFill>
+                <a:effectLst/>
+                <a:uLnTx/>
+                <a:uFillTx/>
+                <a:latin typeface="Courier New" pitchFamily="49" charset="0"/>
+                <a:ea typeface="+mn-ea"/>
+                <a:cs typeface="Courier New" pitchFamily="49" charset="0"/>
+              </a:rPr>
+              <a:t>.</a:t>
+            </a:r>
+            <a:r>
+              <a:rPr kumimoji="0" lang="fr-FR" sz="2000" b="0" i="0" u="none" strike="noStrike" kern="1200" cap="none" spc="0" normalizeH="0" baseline="0" noProof="0" dirty="0" err="1" smtClean="0">
+                <a:ln>
+                  <a:noFill/>
+                </a:ln>
+                <a:solidFill>
+                  <a:schemeClr val="tx1"/>
+                </a:solidFill>
+                <a:effectLst/>
+                <a:uLnTx/>
+                <a:uFillTx/>
+                <a:latin typeface="Courier New" pitchFamily="49" charset="0"/>
+                <a:ea typeface="+mn-ea"/>
+                <a:cs typeface="Courier New" pitchFamily="49" charset="0"/>
+              </a:rPr>
+              <a:t>incr</a:t>
+            </a:r>
+            <a:r>
+              <a:rPr kumimoji="0" lang="fr-FR" sz="2000" b="0" i="0" u="none" strike="noStrike" kern="1200" cap="none" spc="0" normalizeH="0" baseline="0" noProof="0" dirty="0" smtClean="0">
+                <a:ln>
+                  <a:noFill/>
+                </a:ln>
+                <a:solidFill>
+                  <a:schemeClr val="tx1"/>
+                </a:solidFill>
+                <a:effectLst/>
+                <a:uLnTx/>
+                <a:uFillTx/>
+                <a:latin typeface="Courier New" pitchFamily="49" charset="0"/>
+                <a:ea typeface="+mn-ea"/>
+                <a:cs typeface="Courier New" pitchFamily="49" charset="0"/>
+              </a:rPr>
+              <a:t>():::EXIT26</a:t>
+            </a:r>
+          </a:p>
+          <a:p>
+            <a:pPr marL="365760" marR="0" lvl="0" indent="-256032" algn="l" defTabSz="914400" rtl="0" eaLnBrk="1" fontAlgn="auto" latinLnBrk="0" hangingPunct="1">
+              <a:lnSpc>
+                <a:spcPct val="100000"/>
+              </a:lnSpc>
+              <a:spcBef>
+                <a:spcPts val="300"/>
+              </a:spcBef>
+              <a:spcAft>
+                <a:spcPts val="0"/>
+              </a:spcAft>
+              <a:buClr>
+                <a:schemeClr val="accent3"/>
+              </a:buClr>
+              <a:buSzTx/>
+              <a:buFont typeface="Georgia"/>
+              <a:buNone/>
+              <a:tabLst/>
+              <a:defRPr/>
+            </a:pPr>
+            <a:r>
+              <a:rPr kumimoji="0" lang="fr-FR" sz="2000" b="0" i="0" u="none" strike="noStrike" kern="1200" cap="none" spc="0" normalizeH="0" baseline="0" noProof="0" dirty="0" err="1" smtClean="0">
+                <a:ln>
+                  <a:noFill/>
+                </a:ln>
+                <a:solidFill>
+                  <a:schemeClr val="tx1"/>
+                </a:solidFill>
+                <a:effectLst/>
+                <a:uLnTx/>
+                <a:uFillTx/>
+                <a:latin typeface="Courier New" pitchFamily="49" charset="0"/>
+                <a:ea typeface="+mn-ea"/>
+                <a:cs typeface="Courier New" pitchFamily="49" charset="0"/>
+              </a:rPr>
+              <a:t>this_invocation_nonce</a:t>
+            </a:r>
+            <a:endParaRPr kumimoji="0" lang="fr-FR" sz="2000" b="0" i="0" u="none" strike="noStrike" kern="1200" cap="none" spc="0" normalizeH="0" baseline="0" noProof="0" dirty="0" smtClean="0">
+              <a:ln>
+                <a:noFill/>
+              </a:ln>
+              <a:solidFill>
+                <a:schemeClr val="tx1"/>
+              </a:solidFill>
+              <a:effectLst/>
+              <a:uLnTx/>
+              <a:uFillTx/>
+              <a:latin typeface="Courier New" pitchFamily="49" charset="0"/>
+              <a:ea typeface="+mn-ea"/>
+              <a:cs typeface="Courier New" pitchFamily="49" charset="0"/>
+            </a:endParaRPr>
+          </a:p>
+          <a:p>
+            <a:pPr marL="365760" marR="0" lvl="0" indent="-256032" algn="l" defTabSz="914400" rtl="0" eaLnBrk="1" fontAlgn="auto" latinLnBrk="0" hangingPunct="1">
+              <a:lnSpc>
+                <a:spcPct val="100000"/>
+              </a:lnSpc>
+              <a:spcBef>
+                <a:spcPts val="300"/>
+              </a:spcBef>
+              <a:spcAft>
+                <a:spcPts val="0"/>
+              </a:spcAft>
+              <a:buClr>
+                <a:schemeClr val="accent3"/>
+              </a:buClr>
+              <a:buSzTx/>
+              <a:buFont typeface="Georgia"/>
+              <a:buNone/>
+              <a:tabLst/>
+              <a:defRPr/>
+            </a:pPr>
+            <a:r>
+              <a:rPr kumimoji="0" lang="fr-FR" sz="2000" b="0" i="0" u="none" strike="noStrike" kern="1200" cap="none" spc="0" normalizeH="0" baseline="0" noProof="0" dirty="0" smtClean="0">
+                <a:ln>
+                  <a:noFill/>
+                </a:ln>
+                <a:solidFill>
+                  <a:schemeClr val="tx1"/>
+                </a:solidFill>
+                <a:effectLst/>
+                <a:uLnTx/>
+                <a:uFillTx/>
+                <a:latin typeface="Courier New" pitchFamily="49" charset="0"/>
+                <a:ea typeface="+mn-ea"/>
+                <a:cs typeface="Courier New" pitchFamily="49" charset="0"/>
+              </a:rPr>
+              <a:t>4</a:t>
+            </a:r>
+          </a:p>
+          <a:p>
+            <a:pPr marL="365760" marR="0" lvl="0" indent="-256032" algn="l" defTabSz="914400" rtl="0" eaLnBrk="1" fontAlgn="auto" latinLnBrk="0" hangingPunct="1">
+              <a:lnSpc>
+                <a:spcPct val="100000"/>
+              </a:lnSpc>
+              <a:spcBef>
+                <a:spcPts val="300"/>
+              </a:spcBef>
+              <a:spcAft>
+                <a:spcPts val="0"/>
+              </a:spcAft>
+              <a:buClr>
+                <a:schemeClr val="accent3"/>
+              </a:buClr>
+              <a:buSzTx/>
+              <a:buFont typeface="Georgia"/>
+              <a:buNone/>
+              <a:tabLst/>
+              <a:defRPr/>
+            </a:pPr>
+            <a:r>
+              <a:rPr kumimoji="0" lang="fr-FR" sz="2000" b="0" i="0" u="none" strike="noStrike" kern="1200" cap="none" spc="0" normalizeH="0" baseline="0" noProof="0" dirty="0" err="1" smtClean="0">
+                <a:ln>
+                  <a:noFill/>
+                </a:ln>
+                <a:solidFill>
+                  <a:schemeClr val="tx1"/>
+                </a:solidFill>
+                <a:effectLst/>
+                <a:uLnTx/>
+                <a:uFillTx/>
+                <a:latin typeface="Courier New" pitchFamily="49" charset="0"/>
+                <a:ea typeface="+mn-ea"/>
+                <a:cs typeface="Courier New" pitchFamily="49" charset="0"/>
+              </a:rPr>
+              <a:t>perso.test2</a:t>
+            </a:r>
+            <a:r>
+              <a:rPr kumimoji="0" lang="fr-FR" sz="2000" b="0" i="0" u="none" strike="noStrike" kern="1200" cap="none" spc="0" normalizeH="0" baseline="0" noProof="0" dirty="0" smtClean="0">
+                <a:ln>
+                  <a:noFill/>
+                </a:ln>
+                <a:solidFill>
+                  <a:schemeClr val="tx1"/>
+                </a:solidFill>
+                <a:effectLst/>
+                <a:uLnTx/>
+                <a:uFillTx/>
+                <a:latin typeface="Courier New" pitchFamily="49" charset="0"/>
+                <a:ea typeface="+mn-ea"/>
+                <a:cs typeface="Courier New" pitchFamily="49" charset="0"/>
+              </a:rPr>
+              <a:t>.l</a:t>
+            </a:r>
+          </a:p>
+          <a:p>
+            <a:pPr marL="365760" marR="0" lvl="0" indent="-256032" algn="l" defTabSz="914400" rtl="0" eaLnBrk="1" fontAlgn="auto" latinLnBrk="0" hangingPunct="1">
+              <a:lnSpc>
+                <a:spcPct val="100000"/>
+              </a:lnSpc>
+              <a:spcBef>
+                <a:spcPts val="300"/>
+              </a:spcBef>
+              <a:spcAft>
+                <a:spcPts val="0"/>
+              </a:spcAft>
+              <a:buClr>
+                <a:schemeClr val="accent3"/>
+              </a:buClr>
+              <a:buSzTx/>
+              <a:buFont typeface="Georgia"/>
+              <a:buNone/>
+              <a:tabLst/>
+              <a:defRPr/>
+            </a:pPr>
+            <a:r>
+              <a:rPr kumimoji="0" lang="fr-FR" sz="2000" b="0" i="0" u="none" strike="noStrike" kern="1200" cap="none" spc="0" normalizeH="0" baseline="0" noProof="0" dirty="0" smtClean="0">
+                <a:ln>
+                  <a:noFill/>
+                </a:ln>
+                <a:solidFill>
+                  <a:schemeClr val="tx1"/>
+                </a:solidFill>
+                <a:effectLst/>
+                <a:uLnTx/>
+                <a:uFillTx/>
+                <a:latin typeface="Courier New" pitchFamily="49" charset="0"/>
+                <a:ea typeface="+mn-ea"/>
+                <a:cs typeface="Courier New" pitchFamily="49" charset="0"/>
+              </a:rPr>
+              <a:t>4</a:t>
+            </a:r>
+          </a:p>
+          <a:p>
+            <a:pPr marL="365760" marR="0" lvl="0" indent="-256032" algn="l" defTabSz="914400" rtl="0" eaLnBrk="1" fontAlgn="auto" latinLnBrk="0" hangingPunct="1">
+              <a:lnSpc>
+                <a:spcPct val="100000"/>
+              </a:lnSpc>
+              <a:spcBef>
+                <a:spcPts val="300"/>
+              </a:spcBef>
+              <a:spcAft>
+                <a:spcPts val="0"/>
+              </a:spcAft>
+              <a:buClr>
+                <a:schemeClr val="accent3"/>
+              </a:buClr>
+              <a:buSzTx/>
+              <a:buFont typeface="Georgia"/>
+              <a:buNone/>
+              <a:tabLst/>
+              <a:defRPr/>
+            </a:pPr>
+            <a:r>
+              <a:rPr kumimoji="0" lang="fr-FR" sz="2000" b="0" i="0" u="none" strike="noStrike" kern="1200" cap="none" spc="0" normalizeH="0" baseline="0" noProof="0" dirty="0" smtClean="0">
+                <a:ln>
+                  <a:noFill/>
+                </a:ln>
+                <a:solidFill>
+                  <a:schemeClr val="tx1"/>
+                </a:solidFill>
+                <a:effectLst/>
+                <a:uLnTx/>
+                <a:uFillTx/>
+                <a:latin typeface="Courier New" pitchFamily="49" charset="0"/>
+                <a:ea typeface="+mn-ea"/>
+                <a:cs typeface="Courier New" pitchFamily="49" charset="0"/>
+              </a:rPr>
+              <a:t>1</a:t>
+            </a:r>
+          </a:p>
+          <a:p>
+            <a:pPr marL="365760" marR="0" lvl="0" indent="-256032" algn="l" defTabSz="914400" rtl="0" eaLnBrk="1" fontAlgn="auto" latinLnBrk="0" hangingPunct="1">
+              <a:lnSpc>
+                <a:spcPct val="100000"/>
+              </a:lnSpc>
+              <a:spcBef>
+                <a:spcPts val="300"/>
+              </a:spcBef>
+              <a:spcAft>
+                <a:spcPts val="0"/>
+              </a:spcAft>
+              <a:buClr>
+                <a:schemeClr val="accent3"/>
+              </a:buClr>
+              <a:buSzTx/>
+              <a:buFont typeface="Georgia"/>
+              <a:buNone/>
+              <a:tabLst/>
+              <a:defRPr/>
+            </a:pPr>
+            <a:r>
+              <a:rPr kumimoji="0" lang="fr-FR" sz="2000" b="0" i="0" u="none" strike="noStrike" kern="1200" cap="none" spc="0" normalizeH="0" baseline="0" noProof="0" dirty="0" err="1" smtClean="0">
+                <a:ln>
+                  <a:noFill/>
+                </a:ln>
+                <a:solidFill>
+                  <a:schemeClr val="tx1"/>
+                </a:solidFill>
+                <a:effectLst/>
+                <a:uLnTx/>
+                <a:uFillTx/>
+                <a:latin typeface="Courier New" pitchFamily="49" charset="0"/>
+                <a:ea typeface="+mn-ea"/>
+                <a:cs typeface="Courier New" pitchFamily="49" charset="0"/>
+              </a:rPr>
+              <a:t>perso.test2</a:t>
+            </a:r>
+            <a:r>
+              <a:rPr kumimoji="0" lang="fr-FR" sz="2000" b="0" i="0" u="none" strike="noStrike" kern="1200" cap="none" spc="0" normalizeH="0" baseline="0" noProof="0" dirty="0" smtClean="0">
+                <a:ln>
+                  <a:noFill/>
+                </a:ln>
+                <a:solidFill>
+                  <a:schemeClr val="tx1"/>
+                </a:solidFill>
+                <a:effectLst/>
+                <a:uLnTx/>
+                <a:uFillTx/>
+                <a:latin typeface="Courier New" pitchFamily="49" charset="0"/>
+                <a:ea typeface="+mn-ea"/>
+                <a:cs typeface="Courier New" pitchFamily="49" charset="0"/>
+              </a:rPr>
+              <a:t>.i</a:t>
+            </a:r>
+          </a:p>
+          <a:p>
+            <a:pPr marL="365760" marR="0" lvl="0" indent="-256032" algn="l" defTabSz="914400" rtl="0" eaLnBrk="1" fontAlgn="auto" latinLnBrk="0" hangingPunct="1">
+              <a:lnSpc>
+                <a:spcPct val="100000"/>
+              </a:lnSpc>
+              <a:spcBef>
+                <a:spcPts val="300"/>
+              </a:spcBef>
+              <a:spcAft>
+                <a:spcPts val="0"/>
+              </a:spcAft>
+              <a:buClr>
+                <a:schemeClr val="accent3"/>
+              </a:buClr>
+              <a:buSzTx/>
+              <a:buFont typeface="Georgia"/>
+              <a:buNone/>
+              <a:tabLst/>
+              <a:defRPr/>
+            </a:pPr>
+            <a:r>
+              <a:rPr kumimoji="0" lang="fr-FR" sz="2000" b="0" i="0" u="none" strike="noStrike" kern="1200" cap="none" spc="0" normalizeH="0" baseline="0" noProof="0" dirty="0" smtClean="0">
+                <a:ln>
+                  <a:noFill/>
+                </a:ln>
+                <a:solidFill>
+                  <a:schemeClr val="tx1"/>
+                </a:solidFill>
+                <a:effectLst/>
+                <a:uLnTx/>
+                <a:uFillTx/>
+                <a:latin typeface="Courier New" pitchFamily="49" charset="0"/>
+                <a:ea typeface="+mn-ea"/>
+                <a:cs typeface="Courier New" pitchFamily="49" charset="0"/>
+              </a:rPr>
+              <a:t>4</a:t>
+            </a:r>
+          </a:p>
+          <a:p>
+            <a:pPr marL="365760" marR="0" lvl="0" indent="-256032" algn="l" defTabSz="914400" rtl="0" eaLnBrk="1" fontAlgn="auto" latinLnBrk="0" hangingPunct="1">
+              <a:lnSpc>
+                <a:spcPct val="100000"/>
+              </a:lnSpc>
+              <a:spcBef>
+                <a:spcPts val="300"/>
+              </a:spcBef>
+              <a:spcAft>
+                <a:spcPts val="0"/>
+              </a:spcAft>
+              <a:buClr>
+                <a:schemeClr val="accent3"/>
+              </a:buClr>
+              <a:buSzTx/>
+              <a:buFont typeface="Georgia"/>
+              <a:buNone/>
+              <a:tabLst/>
+              <a:defRPr/>
+            </a:pPr>
+            <a:r>
+              <a:rPr kumimoji="0" lang="fr-FR" sz="2000" b="0" i="0" u="none" strike="noStrike" kern="1200" cap="none" spc="0" normalizeH="0" baseline="0" noProof="0" dirty="0" smtClean="0">
+                <a:ln>
+                  <a:noFill/>
+                </a:ln>
+                <a:solidFill>
+                  <a:schemeClr val="tx1"/>
+                </a:solidFill>
+                <a:effectLst/>
+                <a:uLnTx/>
+                <a:uFillTx/>
+                <a:latin typeface="Courier New" pitchFamily="49" charset="0"/>
+                <a:ea typeface="+mn-ea"/>
+                <a:cs typeface="Courier New" pitchFamily="49" charset="0"/>
+              </a:rPr>
+              <a:t>1</a:t>
+            </a:r>
+          </a:p>
+          <a:p>
+            <a:pPr marL="365760" marR="0" lvl="0" indent="-256032" algn="l" defTabSz="914400" rtl="0" eaLnBrk="1" fontAlgn="auto" latinLnBrk="0" hangingPunct="1">
+              <a:lnSpc>
+                <a:spcPct val="100000"/>
+              </a:lnSpc>
+              <a:spcBef>
+                <a:spcPts val="300"/>
+              </a:spcBef>
+              <a:spcAft>
+                <a:spcPts val="0"/>
+              </a:spcAft>
+              <a:buClr>
+                <a:schemeClr val="accent3"/>
+              </a:buClr>
+              <a:buSzTx/>
+              <a:buFont typeface="Georgia"/>
+              <a:buNone/>
+              <a:tabLst/>
+              <a:defRPr/>
+            </a:pPr>
+            <a:r>
+              <a:rPr kumimoji="0" lang="fr-FR" sz="2000" b="0" i="0" u="none" strike="noStrike" kern="1200" cap="none" spc="0" normalizeH="0" baseline="0" noProof="0" dirty="0" err="1" smtClean="0">
+                <a:ln>
+                  <a:noFill/>
+                </a:ln>
+                <a:solidFill>
+                  <a:schemeClr val="tx1"/>
+                </a:solidFill>
+                <a:effectLst/>
+                <a:uLnTx/>
+                <a:uFillTx/>
+                <a:latin typeface="Courier New" pitchFamily="49" charset="0"/>
+                <a:ea typeface="+mn-ea"/>
+                <a:cs typeface="Courier New" pitchFamily="49" charset="0"/>
+              </a:rPr>
+              <a:t>perso.test2</a:t>
+            </a:r>
+            <a:r>
+              <a:rPr kumimoji="0" lang="fr-FR" sz="2000" b="0" i="0" u="none" strike="noStrike" kern="1200" cap="none" spc="0" normalizeH="0" baseline="0" noProof="0" dirty="0" smtClean="0">
+                <a:ln>
+                  <a:noFill/>
+                </a:ln>
+                <a:solidFill>
+                  <a:schemeClr val="tx1"/>
+                </a:solidFill>
+                <a:effectLst/>
+                <a:uLnTx/>
+                <a:uFillTx/>
+                <a:latin typeface="Courier New" pitchFamily="49" charset="0"/>
+                <a:ea typeface="+mn-ea"/>
+                <a:cs typeface="Courier New" pitchFamily="49" charset="0"/>
+              </a:rPr>
+              <a:t>.</a:t>
+            </a:r>
+            <a:r>
+              <a:rPr kumimoji="0" lang="fr-FR" sz="2000" b="0" i="0" u="none" strike="noStrike" kern="1200" cap="none" spc="0" normalizeH="0" baseline="0" noProof="0" dirty="0" err="1" smtClean="0">
+                <a:ln>
+                  <a:noFill/>
+                </a:ln>
+                <a:solidFill>
+                  <a:schemeClr val="tx1"/>
+                </a:solidFill>
+                <a:effectLst/>
+                <a:uLnTx/>
+                <a:uFillTx/>
+                <a:latin typeface="Courier New" pitchFamily="49" charset="0"/>
+                <a:ea typeface="+mn-ea"/>
+                <a:cs typeface="Courier New" pitchFamily="49" charset="0"/>
+              </a:rPr>
+              <a:t>useless</a:t>
+            </a:r>
+            <a:endParaRPr kumimoji="0" lang="fr-FR" sz="2000" b="0" i="0" u="none" strike="noStrike" kern="1200" cap="none" spc="0" normalizeH="0" baseline="0" noProof="0" dirty="0" smtClean="0">
+              <a:ln>
+                <a:noFill/>
+              </a:ln>
+              <a:solidFill>
+                <a:schemeClr val="tx1"/>
+              </a:solidFill>
+              <a:effectLst/>
+              <a:uLnTx/>
+              <a:uFillTx/>
+              <a:latin typeface="Courier New" pitchFamily="49" charset="0"/>
+              <a:ea typeface="+mn-ea"/>
+              <a:cs typeface="Courier New" pitchFamily="49" charset="0"/>
+            </a:endParaRPr>
+          </a:p>
+          <a:p>
+            <a:pPr marL="365760" marR="0" lvl="0" indent="-256032" algn="l" defTabSz="914400" rtl="0" eaLnBrk="1" fontAlgn="auto" latinLnBrk="0" hangingPunct="1">
+              <a:lnSpc>
+                <a:spcPct val="100000"/>
+              </a:lnSpc>
+              <a:spcBef>
+                <a:spcPts val="300"/>
+              </a:spcBef>
+              <a:spcAft>
+                <a:spcPts val="0"/>
+              </a:spcAft>
+              <a:buClr>
+                <a:schemeClr val="accent3"/>
+              </a:buClr>
+              <a:buSzTx/>
+              <a:buFont typeface="Georgia"/>
+              <a:buNone/>
+              <a:tabLst/>
+              <a:defRPr/>
+            </a:pPr>
+            <a:r>
+              <a:rPr kumimoji="0" lang="fr-FR" sz="2000" b="0" i="0" u="none" strike="noStrike" kern="1200" cap="none" spc="0" normalizeH="0" baseline="0" noProof="0" dirty="0" smtClean="0">
+                <a:ln>
+                  <a:noFill/>
+                </a:ln>
+                <a:solidFill>
+                  <a:schemeClr val="tx1"/>
+                </a:solidFill>
+                <a:effectLst/>
+                <a:uLnTx/>
+                <a:uFillTx/>
+                <a:latin typeface="Courier New" pitchFamily="49" charset="0"/>
+                <a:ea typeface="+mn-ea"/>
+                <a:cs typeface="Courier New" pitchFamily="49" charset="0"/>
+              </a:rPr>
+              <a:t>0</a:t>
+            </a:r>
+          </a:p>
+          <a:p>
+            <a:pPr marL="365760" marR="0" lvl="0" indent="-256032" algn="l" defTabSz="914400" rtl="0" eaLnBrk="1" fontAlgn="auto" latinLnBrk="0" hangingPunct="1">
+              <a:lnSpc>
+                <a:spcPct val="100000"/>
+              </a:lnSpc>
+              <a:spcBef>
+                <a:spcPts val="300"/>
+              </a:spcBef>
+              <a:spcAft>
+                <a:spcPts val="0"/>
+              </a:spcAft>
+              <a:buClr>
+                <a:schemeClr val="accent3"/>
+              </a:buClr>
+              <a:buSzTx/>
+              <a:buFont typeface="Georgia"/>
+              <a:buNone/>
+              <a:tabLst/>
+              <a:defRPr/>
+            </a:pPr>
+            <a:r>
+              <a:rPr kumimoji="0" lang="fr-FR" sz="2000" b="0" i="0" u="none" strike="noStrike" kern="1200" cap="none" spc="0" normalizeH="0" baseline="0" noProof="0" dirty="0" smtClean="0">
+                <a:ln>
+                  <a:noFill/>
+                </a:ln>
+                <a:solidFill>
+                  <a:schemeClr val="tx1"/>
+                </a:solidFill>
+                <a:effectLst/>
+                <a:uLnTx/>
+                <a:uFillTx/>
+                <a:latin typeface="Courier New" pitchFamily="49" charset="0"/>
+                <a:ea typeface="+mn-ea"/>
+                <a:cs typeface="Courier New" pitchFamily="49" charset="0"/>
+              </a:rPr>
+              <a:t>1</a:t>
+            </a:r>
+          </a:p>
+          <a:p>
+            <a:pPr marL="365760" marR="0" lvl="0" indent="-256032" algn="l" defTabSz="914400" rtl="0" eaLnBrk="1" fontAlgn="auto" latinLnBrk="0" hangingPunct="1">
+              <a:lnSpc>
+                <a:spcPct val="100000"/>
+              </a:lnSpc>
+              <a:spcBef>
+                <a:spcPts val="300"/>
+              </a:spcBef>
+              <a:spcAft>
+                <a:spcPts val="0"/>
+              </a:spcAft>
+              <a:buClr>
+                <a:schemeClr val="accent3"/>
+              </a:buClr>
+              <a:buSzTx/>
+              <a:buFont typeface="Georgia"/>
+              <a:buChar char="•"/>
+              <a:tabLst/>
+              <a:defRPr/>
+            </a:pPr>
+            <a:endParaRPr kumimoji="0" lang="en-US" sz="2000" b="0" i="0" u="none" strike="noStrike" kern="1200" cap="none" spc="0" normalizeH="0" baseline="0" noProof="0" dirty="0">
+              <a:ln>
+                <a:noFill/>
+              </a:ln>
+              <a:solidFill>
+                <a:schemeClr val="tx1"/>
+              </a:solidFill>
+              <a:effectLst/>
+              <a:uLnTx/>
+              <a:uFillTx/>
+              <a:latin typeface="+mn-lt"/>
+              <a:ea typeface="+mn-ea"/>
+              <a:cs typeface="+mn-cs"/>
+            </a:endParaRPr>
+          </a:p>
+        </p:txBody>
+      </p:sp>
+      <p:sp>
+        <p:nvSpPr>
+          <p:cNvPr id="9" name="Espace réservé du numéro de diapositive 8"/>
+          <p:cNvSpPr>
+            <a:spLocks noGrp="1"/>
+          </p:cNvSpPr>
+          <p:nvPr>
+            <p:ph type="sldNum" sz="quarter" idx="11"/>
+          </p:nvPr>
+        </p:nvSpPr>
+        <p:spPr/>
+        <p:txBody>
+          <a:bodyPr/>
+          <a:lstStyle/>
+          <a:p>
+            <a:fld id="{C59E0035-AE90-440C-AA1E-C825D223288E}" type="slidenum">
+              <a:rPr lang="fr-FR" smtClean="0"/>
+              <a:pPr/>
+              <a:t>6</a:t>
+            </a:fld>
+            <a:endParaRPr lang="fr-FR"/>
+          </a:p>
+        </p:txBody>
+      </p:sp>
     </p:spTree>
   </p:cSld>
   <p:clrMapOvr>
@@ -14754,6 +17485,30 @@
           </a:p>
         </p:txBody>
       </p:sp>
+      <p:sp>
+        <p:nvSpPr>
+          <p:cNvPr id="5" name="Espace réservé du numéro de diapositive 4"/>
+          <p:cNvSpPr>
+            <a:spLocks noGrp="1"/>
+          </p:cNvSpPr>
+          <p:nvPr>
+            <p:ph type="sldNum" sz="quarter" idx="12"/>
+          </p:nvPr>
+        </p:nvSpPr>
+        <p:spPr/>
+        <p:txBody>
+          <a:bodyPr/>
+          <a:lstStyle/>
+          <a:p>
+            <a:fld id="{C59E0035-AE90-440C-AA1E-C825D223288E}" type="slidenum">
+              <a:rPr lang="fr-FR" smtClean="0"/>
+              <a:pPr/>
+              <a:t>7</a:t>
+            </a:fld>
+            <a:endParaRPr lang="fr-FR"/>
+          </a:p>
+        </p:txBody>
+      </p:sp>
     </p:spTree>
   </p:cSld>
   <p:clrMapOvr>
@@ -15037,6 +17792,30 @@
           </a:p>
         </p:txBody>
       </p:sp>
+      <p:sp>
+        <p:nvSpPr>
+          <p:cNvPr id="6" name="Espace réservé du numéro de diapositive 5"/>
+          <p:cNvSpPr>
+            <a:spLocks noGrp="1"/>
+          </p:cNvSpPr>
+          <p:nvPr>
+            <p:ph type="sldNum" sz="quarter" idx="12"/>
+          </p:nvPr>
+        </p:nvSpPr>
+        <p:spPr/>
+        <p:txBody>
+          <a:bodyPr/>
+          <a:lstStyle/>
+          <a:p>
+            <a:fld id="{C59E0035-AE90-440C-AA1E-C825D223288E}" type="slidenum">
+              <a:rPr lang="fr-FR" smtClean="0"/>
+              <a:pPr/>
+              <a:t>8</a:t>
+            </a:fld>
+            <a:endParaRPr lang="fr-FR"/>
+          </a:p>
+        </p:txBody>
+      </p:sp>
     </p:spTree>
   </p:cSld>
   <p:clrMapOvr>
@@ -15286,6 +18065,30 @@
               </a:solidFill>
               <a:latin typeface="+mj-lt"/>
             </a:endParaRPr>
+          </a:p>
+        </p:txBody>
+      </p:sp>
+      <p:sp>
+        <p:nvSpPr>
+          <p:cNvPr id="6" name="Espace réservé du numéro de diapositive 5"/>
+          <p:cNvSpPr>
+            <a:spLocks noGrp="1"/>
+          </p:cNvSpPr>
+          <p:nvPr>
+            <p:ph type="sldNum" sz="quarter" idx="12"/>
+          </p:nvPr>
+        </p:nvSpPr>
+        <p:spPr/>
+        <p:txBody>
+          <a:bodyPr/>
+          <a:lstStyle/>
+          <a:p>
+            <a:fld id="{C59E0035-AE90-440C-AA1E-C825D223288E}" type="slidenum">
+              <a:rPr lang="fr-FR" smtClean="0"/>
+              <a:pPr/>
+              <a:t>9</a:t>
+            </a:fld>
+            <a:endParaRPr lang="fr-FR"/>
           </a:p>
         </p:txBody>
       </p:sp>
@@ -15858,4 +18661,287 @@
   <a:objectDefaults/>
   <a:extraClrSchemeLst/>
 </a:theme>
+</file>
+
+<file path=ppt/theme/theme3.xml><?xml version="1.0" encoding="utf-8"?>
+<a:theme xmlns:a="http://schemas.openxmlformats.org/drawingml/2006/main" name="Thème Office">
+  <a:themeElements>
+    <a:clrScheme name="Office">
+      <a:dk1>
+        <a:sysClr val="windowText" lastClr="000000"/>
+      </a:dk1>
+      <a:lt1>
+        <a:sysClr val="window" lastClr="FFFFFF"/>
+      </a:lt1>
+      <a:dk2>
+        <a:srgbClr val="1F497D"/>
+      </a:dk2>
+      <a:lt2>
+        <a:srgbClr val="EEECE1"/>
+      </a:lt2>
+      <a:accent1>
+        <a:srgbClr val="4F81BD"/>
+      </a:accent1>
+      <a:accent2>
+        <a:srgbClr val="C0504D"/>
+      </a:accent2>
+      <a:accent3>
+        <a:srgbClr val="9BBB59"/>
+      </a:accent3>
+      <a:accent4>
+        <a:srgbClr val="8064A2"/>
+      </a:accent4>
+      <a:accent5>
+        <a:srgbClr val="4BACC6"/>
+      </a:accent5>
+      <a:accent6>
+        <a:srgbClr val="F79646"/>
+      </a:accent6>
+      <a:hlink>
+        <a:srgbClr val="0000FF"/>
+      </a:hlink>
+      <a:folHlink>
+        <a:srgbClr val="800080"/>
+      </a:folHlink>
+    </a:clrScheme>
+    <a:fontScheme name="Office">
+      <a:majorFont>
+        <a:latin typeface="Calibri"/>
+        <a:ea typeface=""/>
+        <a:cs typeface=""/>
+        <a:font script="Jpan" typeface="ＭＳ Ｐゴシック"/>
+        <a:font script="Hang" typeface="맑은 고딕"/>
+        <a:font script="Hans" typeface="宋体"/>
+        <a:font script="Hant" typeface="新細明體"/>
+        <a:font script="Arab" typeface="Times New Roman"/>
+        <a:font script="Hebr" typeface="Times New Roman"/>
+        <a:font script="Thai" typeface="Angsana New"/>
+        <a:font script="Ethi" typeface="Nyala"/>
+        <a:font script="Beng" typeface="Vrinda"/>
+        <a:font script="Gujr" typeface="Shruti"/>
+        <a:font script="Khmr" typeface="MoolBoran"/>
+        <a:font script="Knda" typeface="Tunga"/>
+        <a:font script="Guru" typeface="Raavi"/>
+        <a:font script="Cans" typeface="Euphemia"/>
+        <a:font script="Cher" typeface="Plantagenet Cherokee"/>
+        <a:font script="Yiii" typeface="Microsoft Yi Baiti"/>
+        <a:font script="Tibt" typeface="Microsoft Himalaya"/>
+        <a:font script="Thaa" typeface="MV Boli"/>
+        <a:font script="Deva" typeface="Mangal"/>
+        <a:font script="Telu" typeface="Gautami"/>
+        <a:font script="Taml" typeface="Latha"/>
+        <a:font script="Syrc" typeface="Estrangelo Edessa"/>
+        <a:font script="Orya" typeface="Kalinga"/>
+        <a:font script="Mlym" typeface="Kartika"/>
+        <a:font script="Laoo" typeface="DokChampa"/>
+        <a:font script="Sinh" typeface="Iskoola Pota"/>
+        <a:font script="Mong" typeface="Mongolian Baiti"/>
+        <a:font script="Viet" typeface="Times New Roman"/>
+        <a:font script="Uigh" typeface="Microsoft Uighur"/>
+      </a:majorFont>
+      <a:minorFont>
+        <a:latin typeface="Calibri"/>
+        <a:ea typeface=""/>
+        <a:cs typeface=""/>
+        <a:font script="Jpan" typeface="ＭＳ Ｐゴシック"/>
+        <a:font script="Hang" typeface="맑은 고딕"/>
+        <a:font script="Hans" typeface="宋体"/>
+        <a:font script="Hant" typeface="新細明體"/>
+        <a:font script="Arab" typeface="Arial"/>
+        <a:font script="Hebr" typeface="Arial"/>
+        <a:font script="Thai" typeface="Cordia New"/>
+        <a:font script="Ethi" typeface="Nyala"/>
+        <a:font script="Beng" typeface="Vrinda"/>
+        <a:font script="Gujr" typeface="Shruti"/>
+        <a:font script="Khmr" typeface="DaunPenh"/>
+        <a:font script="Knda" typeface="Tunga"/>
+        <a:font script="Guru" typeface="Raavi"/>
+        <a:font script="Cans" typeface="Euphemia"/>
+        <a:font script="Cher" typeface="Plantagenet Cherokee"/>
+        <a:font script="Yiii" typeface="Microsoft Yi Baiti"/>
+        <a:font script="Tibt" typeface="Microsoft Himalaya"/>
+        <a:font script="Thaa" typeface="MV Boli"/>
+        <a:font script="Deva" typeface="Mangal"/>
+        <a:font script="Telu" typeface="Gautami"/>
+        <a:font script="Taml" typeface="Latha"/>
+        <a:font script="Syrc" typeface="Estrangelo Edessa"/>
+        <a:font script="Orya" typeface="Kalinga"/>
+        <a:font script="Mlym" typeface="Kartika"/>
+        <a:font script="Laoo" typeface="DokChampa"/>
+        <a:font script="Sinh" typeface="Iskoola Pota"/>
+        <a:font script="Mong" typeface="Mongolian Baiti"/>
+        <a:font script="Viet" typeface="Arial"/>
+        <a:font script="Uigh" typeface="Microsoft Uighur"/>
+      </a:minorFont>
+    </a:fontScheme>
+    <a:fmtScheme name="Office">
+      <a:fillStyleLst>
+        <a:solidFill>
+          <a:schemeClr val="phClr"/>
+        </a:solidFill>
+        <a:gradFill rotWithShape="1">
+          <a:gsLst>
+            <a:gs pos="0">
+              <a:schemeClr val="phClr">
+                <a:tint val="50000"/>
+                <a:satMod val="300000"/>
+              </a:schemeClr>
+            </a:gs>
+            <a:gs pos="35000">
+              <a:schemeClr val="phClr">
+                <a:tint val="37000"/>
+                <a:satMod val="300000"/>
+              </a:schemeClr>
+            </a:gs>
+            <a:gs pos="100000">
+              <a:schemeClr val="phClr">
+                <a:tint val="15000"/>
+                <a:satMod val="350000"/>
+              </a:schemeClr>
+            </a:gs>
+          </a:gsLst>
+          <a:lin ang="16200000" scaled="1"/>
+        </a:gradFill>
+        <a:gradFill rotWithShape="1">
+          <a:gsLst>
+            <a:gs pos="0">
+              <a:schemeClr val="phClr">
+                <a:shade val="51000"/>
+                <a:satMod val="130000"/>
+              </a:schemeClr>
+            </a:gs>
+            <a:gs pos="80000">
+              <a:schemeClr val="phClr">
+                <a:shade val="93000"/>
+                <a:satMod val="130000"/>
+              </a:schemeClr>
+            </a:gs>
+            <a:gs pos="100000">
+              <a:schemeClr val="phClr">
+                <a:shade val="94000"/>
+                <a:satMod val="135000"/>
+              </a:schemeClr>
+            </a:gs>
+          </a:gsLst>
+          <a:lin ang="16200000" scaled="0"/>
+        </a:gradFill>
+      </a:fillStyleLst>
+      <a:lnStyleLst>
+        <a:ln w="9525" cap="flat" cmpd="sng" algn="ctr">
+          <a:solidFill>
+            <a:schemeClr val="phClr">
+              <a:shade val="95000"/>
+              <a:satMod val="105000"/>
+            </a:schemeClr>
+          </a:solidFill>
+          <a:prstDash val="solid"/>
+        </a:ln>
+        <a:ln w="25400" cap="flat" cmpd="sng" algn="ctr">
+          <a:solidFill>
+            <a:schemeClr val="phClr"/>
+          </a:solidFill>
+          <a:prstDash val="solid"/>
+        </a:ln>
+        <a:ln w="38100" cap="flat" cmpd="sng" algn="ctr">
+          <a:solidFill>
+            <a:schemeClr val="phClr"/>
+          </a:solidFill>
+          <a:prstDash val="solid"/>
+        </a:ln>
+      </a:lnStyleLst>
+      <a:effectStyleLst>
+        <a:effectStyle>
+          <a:effectLst>
+            <a:outerShdw blurRad="40000" dist="20000" dir="5400000" rotWithShape="0">
+              <a:srgbClr val="000000">
+                <a:alpha val="38000"/>
+              </a:srgbClr>
+            </a:outerShdw>
+          </a:effectLst>
+        </a:effectStyle>
+        <a:effectStyle>
+          <a:effectLst>
+            <a:outerShdw blurRad="40000" dist="23000" dir="5400000" rotWithShape="0">
+              <a:srgbClr val="000000">
+                <a:alpha val="35000"/>
+              </a:srgbClr>
+            </a:outerShdw>
+          </a:effectLst>
+        </a:effectStyle>
+        <a:effectStyle>
+          <a:effectLst>
+            <a:outerShdw blurRad="40000" dist="23000" dir="5400000" rotWithShape="0">
+              <a:srgbClr val="000000">
+                <a:alpha val="35000"/>
+              </a:srgbClr>
+            </a:outerShdw>
+          </a:effectLst>
+          <a:scene3d>
+            <a:camera prst="orthographicFront">
+              <a:rot lat="0" lon="0" rev="0"/>
+            </a:camera>
+            <a:lightRig rig="threePt" dir="t">
+              <a:rot lat="0" lon="0" rev="1200000"/>
+            </a:lightRig>
+          </a:scene3d>
+          <a:sp3d>
+            <a:bevelT w="63500" h="25400"/>
+          </a:sp3d>
+        </a:effectStyle>
+      </a:effectStyleLst>
+      <a:bgFillStyleLst>
+        <a:solidFill>
+          <a:schemeClr val="phClr"/>
+        </a:solidFill>
+        <a:gradFill rotWithShape="1">
+          <a:gsLst>
+            <a:gs pos="0">
+              <a:schemeClr val="phClr">
+                <a:tint val="40000"/>
+                <a:satMod val="350000"/>
+              </a:schemeClr>
+            </a:gs>
+            <a:gs pos="40000">
+              <a:schemeClr val="phClr">
+                <a:tint val="45000"/>
+                <a:shade val="99000"/>
+                <a:satMod val="350000"/>
+              </a:schemeClr>
+            </a:gs>
+            <a:gs pos="100000">
+              <a:schemeClr val="phClr">
+                <a:shade val="20000"/>
+                <a:satMod val="255000"/>
+              </a:schemeClr>
+            </a:gs>
+          </a:gsLst>
+          <a:path path="circle">
+            <a:fillToRect l="50000" t="-80000" r="50000" b="180000"/>
+          </a:path>
+        </a:gradFill>
+        <a:gradFill rotWithShape="1">
+          <a:gsLst>
+            <a:gs pos="0">
+              <a:schemeClr val="phClr">
+                <a:tint val="80000"/>
+                <a:satMod val="300000"/>
+              </a:schemeClr>
+            </a:gs>
+            <a:gs pos="100000">
+              <a:schemeClr val="phClr">
+                <a:shade val="30000"/>
+                <a:satMod val="200000"/>
+              </a:schemeClr>
+            </a:gs>
+          </a:gsLst>
+          <a:path path="circle">
+            <a:fillToRect l="50000" t="50000" r="50000" b="50000"/>
+          </a:path>
+        </a:gradFill>
+      </a:bgFillStyleLst>
+    </a:fmtScheme>
+  </a:themeElements>
+  <a:objectDefaults/>
+  <a:extraClrSchemeLst/>
+</a:theme>
 </file>
</xml_diff>